<commit_message>
Updates to NH/EF modules
</commit_message>
<xml_diff>
--- a/Slides/EF/2 - Database First.pptx
+++ b/Slides/EF/2 - Database First.pptx
@@ -5,35 +5,18 @@
     <p:sldMasterId id="2147483660" r:id="rId1"/>
   </p:sldMasterIdLst>
   <p:sldIdLst>
-    <p:sldId id="256" r:id="rId2"/>
-    <p:sldId id="286" r:id="rId3"/>
-    <p:sldId id="282" r:id="rId4"/>
-    <p:sldId id="259" r:id="rId5"/>
-    <p:sldId id="260" r:id="rId6"/>
-    <p:sldId id="268" r:id="rId7"/>
-    <p:sldId id="269" r:id="rId8"/>
-    <p:sldId id="276" r:id="rId9"/>
-    <p:sldId id="271" r:id="rId10"/>
-    <p:sldId id="272" r:id="rId11"/>
-    <p:sldId id="273" r:id="rId12"/>
-    <p:sldId id="278" r:id="rId13"/>
-    <p:sldId id="281" r:id="rId14"/>
-    <p:sldId id="283" r:id="rId15"/>
-    <p:sldId id="284" r:id="rId16"/>
-    <p:sldId id="285" r:id="rId17"/>
-    <p:sldId id="274" r:id="rId18"/>
-    <p:sldId id="279" r:id="rId19"/>
-    <p:sldId id="280" r:id="rId20"/>
-    <p:sldId id="277" r:id="rId21"/>
-    <p:sldId id="275" r:id="rId22"/>
-    <p:sldId id="261" r:id="rId23"/>
-    <p:sldId id="262" r:id="rId24"/>
-    <p:sldId id="263" r:id="rId25"/>
-    <p:sldId id="264" r:id="rId26"/>
-    <p:sldId id="265" r:id="rId27"/>
-    <p:sldId id="266" r:id="rId28"/>
-    <p:sldId id="258" r:id="rId29"/>
-    <p:sldId id="257" r:id="rId30"/>
+    <p:sldId id="286" r:id="rId2"/>
+    <p:sldId id="282" r:id="rId3"/>
+    <p:sldId id="268" r:id="rId4"/>
+    <p:sldId id="278" r:id="rId5"/>
+    <p:sldId id="283" r:id="rId6"/>
+    <p:sldId id="281" r:id="rId7"/>
+    <p:sldId id="288" r:id="rId8"/>
+    <p:sldId id="287" r:id="rId9"/>
+    <p:sldId id="284" r:id="rId10"/>
+    <p:sldId id="262" r:id="rId11"/>
+    <p:sldId id="258" r:id="rId12"/>
+    <p:sldId id="257" r:id="rId13"/>
   </p:sldIdLst>
   <p:sldSz cx="9144000" cy="6858000" type="screen4x3"/>
   <p:notesSz cx="6858000" cy="9144000"/>
@@ -3015,1026 +2998,6 @@
           <a:lstStyle/>
           <a:p>
             <a:r>
-              <a:rPr lang="en-US" dirty="0"/>
-              <a:t>2</a:t>
-            </a:r>
-            <a:r>
-              <a:rPr lang="en-US" dirty="0" smtClean="0"/>
-              <a:t> – EF Database First</a:t>
-            </a:r>
-            <a:endParaRPr lang="en-US" dirty="0"/>
-          </a:p>
-        </p:txBody>
-      </p:sp>
-      <p:sp>
-        <p:nvSpPr>
-          <p:cNvPr id="3" name="Subtitle 2"/>
-          <p:cNvSpPr>
-            <a:spLocks noGrp="1"/>
-          </p:cNvSpPr>
-          <p:nvPr>
-            <p:ph type="subTitle" idx="1"/>
-          </p:nvPr>
-        </p:nvSpPr>
-        <p:spPr/>
-        <p:txBody>
-          <a:bodyPr/>
-          <a:lstStyle/>
-          <a:p>
-            <a:endParaRPr lang="en-US"/>
-          </a:p>
-        </p:txBody>
-      </p:sp>
-    </p:spTree>
-    <p:extLst>
-      <p:ext uri="{BB962C8B-B14F-4D97-AF65-F5344CB8AC3E}">
-        <p14:creationId xmlns:p14="http://schemas.microsoft.com/office/powerpoint/2010/main" val="2301950144"/>
-      </p:ext>
-    </p:extLst>
-  </p:cSld>
-  <p:clrMapOvr>
-    <a:masterClrMapping/>
-  </p:clrMapOvr>
-</p:sld>
-</file>
-
-<file path=ppt/slides/slide10.xml><?xml version="1.0" encoding="utf-8"?>
-<p:sld xmlns:a="http://schemas.openxmlformats.org/drawingml/2006/main" xmlns:r="http://schemas.openxmlformats.org/officeDocument/2006/relationships" xmlns:p="http://schemas.openxmlformats.org/presentationml/2006/main">
-  <p:cSld>
-    <p:spTree>
-      <p:nvGrpSpPr>
-        <p:cNvPr id="1" name=""/>
-        <p:cNvGrpSpPr/>
-        <p:nvPr/>
-      </p:nvGrpSpPr>
-      <p:grpSpPr>
-        <a:xfrm>
-          <a:off x="0" y="0"/>
-          <a:ext cx="0" cy="0"/>
-          <a:chOff x="0" y="0"/>
-          <a:chExt cx="0" cy="0"/>
-        </a:xfrm>
-      </p:grpSpPr>
-      <p:sp>
-        <p:nvSpPr>
-          <p:cNvPr id="2" name="Title 1"/>
-          <p:cNvSpPr>
-            <a:spLocks noGrp="1"/>
-          </p:cNvSpPr>
-          <p:nvPr>
-            <p:ph type="title"/>
-          </p:nvPr>
-        </p:nvSpPr>
-        <p:spPr/>
-        <p:txBody>
-          <a:bodyPr/>
-          <a:lstStyle/>
-          <a:p>
-            <a:r>
-              <a:rPr lang="en-US" dirty="0" smtClean="0"/>
-              <a:t>Run through the Wizard</a:t>
-            </a:r>
-            <a:endParaRPr lang="en-US" dirty="0"/>
-          </a:p>
-        </p:txBody>
-      </p:sp>
-      <p:pic>
-        <p:nvPicPr>
-          <p:cNvPr id="4" name="Picture 3"/>
-          <p:cNvPicPr>
-            <a:picLocks noChangeAspect="1"/>
-          </p:cNvPicPr>
-          <p:nvPr/>
-        </p:nvPicPr>
-        <p:blipFill>
-          <a:blip r:embed="rId2"/>
-          <a:stretch>
-            <a:fillRect/>
-          </a:stretch>
-        </p:blipFill>
-        <p:spPr>
-          <a:xfrm>
-            <a:off x="628650" y="1867710"/>
-            <a:ext cx="3769695" cy="3381375"/>
-          </a:xfrm>
-          <a:prstGeom prst="rect">
-            <a:avLst/>
-          </a:prstGeom>
-        </p:spPr>
-      </p:pic>
-      <p:pic>
-        <p:nvPicPr>
-          <p:cNvPr id="5" name="Picture 4"/>
-          <p:cNvPicPr>
-            <a:picLocks noChangeAspect="1"/>
-          </p:cNvPicPr>
-          <p:nvPr/>
-        </p:nvPicPr>
-        <p:blipFill>
-          <a:blip r:embed="rId3"/>
-          <a:stretch>
-            <a:fillRect/>
-          </a:stretch>
-        </p:blipFill>
-        <p:spPr>
-          <a:xfrm>
-            <a:off x="1352854" y="2426037"/>
-            <a:ext cx="3793078" cy="3402349"/>
-          </a:xfrm>
-          <a:prstGeom prst="rect">
-            <a:avLst/>
-          </a:prstGeom>
-        </p:spPr>
-      </p:pic>
-      <p:pic>
-        <p:nvPicPr>
-          <p:cNvPr id="6" name="Picture 5"/>
-          <p:cNvPicPr>
-            <a:picLocks noChangeAspect="1"/>
-          </p:cNvPicPr>
-          <p:nvPr/>
-        </p:nvPicPr>
-        <p:blipFill>
-          <a:blip r:embed="rId4"/>
-          <a:stretch>
-            <a:fillRect/>
-          </a:stretch>
-        </p:blipFill>
-        <p:spPr>
-          <a:xfrm>
-            <a:off x="3248093" y="3054484"/>
-            <a:ext cx="3795678" cy="3404681"/>
-          </a:xfrm>
-          <a:prstGeom prst="rect">
-            <a:avLst/>
-          </a:prstGeom>
-        </p:spPr>
-      </p:pic>
-      <p:pic>
-        <p:nvPicPr>
-          <p:cNvPr id="7" name="Picture 6"/>
-          <p:cNvPicPr>
-            <a:picLocks noChangeAspect="1"/>
-          </p:cNvPicPr>
-          <p:nvPr/>
-        </p:nvPicPr>
-        <p:blipFill>
-          <a:blip r:embed="rId5"/>
-          <a:stretch>
-            <a:fillRect/>
-          </a:stretch>
-        </p:blipFill>
-        <p:spPr>
-          <a:xfrm>
-            <a:off x="5145932" y="3714039"/>
-            <a:ext cx="3422663" cy="3070091"/>
-          </a:xfrm>
-          <a:prstGeom prst="rect">
-            <a:avLst/>
-          </a:prstGeom>
-        </p:spPr>
-      </p:pic>
-    </p:spTree>
-    <p:extLst>
-      <p:ext uri="{BB962C8B-B14F-4D97-AF65-F5344CB8AC3E}">
-        <p14:creationId xmlns:p14="http://schemas.microsoft.com/office/powerpoint/2010/main" val="4148939582"/>
-      </p:ext>
-    </p:extLst>
-  </p:cSld>
-  <p:clrMapOvr>
-    <a:masterClrMapping/>
-  </p:clrMapOvr>
-</p:sld>
-</file>
-
-<file path=ppt/slides/slide11.xml><?xml version="1.0" encoding="utf-8"?>
-<p:sld xmlns:a="http://schemas.openxmlformats.org/drawingml/2006/main" xmlns:r="http://schemas.openxmlformats.org/officeDocument/2006/relationships" xmlns:p="http://schemas.openxmlformats.org/presentationml/2006/main">
-  <p:cSld>
-    <p:spTree>
-      <p:nvGrpSpPr>
-        <p:cNvPr id="1" name=""/>
-        <p:cNvGrpSpPr/>
-        <p:nvPr/>
-      </p:nvGrpSpPr>
-      <p:grpSpPr>
-        <a:xfrm>
-          <a:off x="0" y="0"/>
-          <a:ext cx="0" cy="0"/>
-          <a:chOff x="0" y="0"/>
-          <a:chExt cx="0" cy="0"/>
-        </a:xfrm>
-      </p:grpSpPr>
-      <p:sp>
-        <p:nvSpPr>
-          <p:cNvPr id="2" name="Title 1"/>
-          <p:cNvSpPr>
-            <a:spLocks noGrp="1"/>
-          </p:cNvSpPr>
-          <p:nvPr>
-            <p:ph type="title"/>
-          </p:nvPr>
-        </p:nvSpPr>
-        <p:spPr/>
-        <p:txBody>
-          <a:bodyPr/>
-          <a:lstStyle/>
-          <a:p>
-            <a:r>
-              <a:rPr lang="en-US" dirty="0" smtClean="0"/>
-              <a:t>Here’s Your Model</a:t>
-            </a:r>
-            <a:endParaRPr lang="en-US" dirty="0"/>
-          </a:p>
-        </p:txBody>
-      </p:sp>
-      <p:pic>
-        <p:nvPicPr>
-          <p:cNvPr id="5" name="Picture 4"/>
-          <p:cNvPicPr>
-            <a:picLocks noChangeAspect="1"/>
-          </p:cNvPicPr>
-          <p:nvPr/>
-        </p:nvPicPr>
-        <p:blipFill>
-          <a:blip r:embed="rId2"/>
-          <a:stretch>
-            <a:fillRect/>
-          </a:stretch>
-        </p:blipFill>
-        <p:spPr>
-          <a:xfrm>
-            <a:off x="725521" y="1575879"/>
-            <a:ext cx="7076061" cy="5107363"/>
-          </a:xfrm>
-          <a:prstGeom prst="rect">
-            <a:avLst/>
-          </a:prstGeom>
-        </p:spPr>
-      </p:pic>
-    </p:spTree>
-    <p:extLst>
-      <p:ext uri="{BB962C8B-B14F-4D97-AF65-F5344CB8AC3E}">
-        <p14:creationId xmlns:p14="http://schemas.microsoft.com/office/powerpoint/2010/main" val="3628054817"/>
-      </p:ext>
-    </p:extLst>
-  </p:cSld>
-  <p:clrMapOvr>
-    <a:masterClrMapping/>
-  </p:clrMapOvr>
-</p:sld>
-</file>
-
-<file path=ppt/slides/slide12.xml><?xml version="1.0" encoding="utf-8"?>
-<p:sld xmlns:a="http://schemas.openxmlformats.org/drawingml/2006/main" xmlns:r="http://schemas.openxmlformats.org/officeDocument/2006/relationships" xmlns:p="http://schemas.openxmlformats.org/presentationml/2006/main">
-  <p:cSld>
-    <p:spTree>
-      <p:nvGrpSpPr>
-        <p:cNvPr id="1" name=""/>
-        <p:cNvGrpSpPr/>
-        <p:nvPr/>
-      </p:nvGrpSpPr>
-      <p:grpSpPr>
-        <a:xfrm>
-          <a:off x="0" y="0"/>
-          <a:ext cx="0" cy="0"/>
-          <a:chOff x="0" y="0"/>
-          <a:chExt cx="0" cy="0"/>
-        </a:xfrm>
-      </p:grpSpPr>
-      <p:sp>
-        <p:nvSpPr>
-          <p:cNvPr id="2" name="Title 1"/>
-          <p:cNvSpPr>
-            <a:spLocks noGrp="1"/>
-          </p:cNvSpPr>
-          <p:nvPr>
-            <p:ph type="title"/>
-          </p:nvPr>
-        </p:nvSpPr>
-        <p:spPr/>
-        <p:txBody>
-          <a:bodyPr/>
-          <a:lstStyle/>
-          <a:p>
-            <a:r>
-              <a:rPr lang="en-US" dirty="0" smtClean="0"/>
-              <a:t>Explore the Model</a:t>
-            </a:r>
-            <a:endParaRPr lang="en-US" dirty="0"/>
-          </a:p>
-        </p:txBody>
-      </p:sp>
-      <p:sp>
-        <p:nvSpPr>
-          <p:cNvPr id="3" name="Content Placeholder 2"/>
-          <p:cNvSpPr>
-            <a:spLocks noGrp="1"/>
-          </p:cNvSpPr>
-          <p:nvPr>
-            <p:ph idx="1"/>
-          </p:nvPr>
-        </p:nvSpPr>
-        <p:spPr/>
-        <p:txBody>
-          <a:bodyPr/>
-          <a:lstStyle/>
-          <a:p>
-            <a:r>
-              <a:rPr lang="en-US" dirty="0" smtClean="0"/>
-              <a:t>Entities and Relationships</a:t>
-            </a:r>
-          </a:p>
-          <a:p>
-            <a:r>
-              <a:rPr lang="en-US" dirty="0" err="1" smtClean="0"/>
-              <a:t>App.config</a:t>
-            </a:r>
-            <a:endParaRPr lang="en-US" dirty="0" smtClean="0"/>
-          </a:p>
-          <a:p>
-            <a:r>
-              <a:rPr lang="en-US" dirty="0" smtClean="0"/>
-              <a:t>Generated code</a:t>
-            </a:r>
-            <a:endParaRPr lang="en-US" dirty="0"/>
-          </a:p>
-        </p:txBody>
-      </p:sp>
-    </p:spTree>
-    <p:extLst>
-      <p:ext uri="{BB962C8B-B14F-4D97-AF65-F5344CB8AC3E}">
-        <p14:creationId xmlns:p14="http://schemas.microsoft.com/office/powerpoint/2010/main" val="2506903841"/>
-      </p:ext>
-    </p:extLst>
-  </p:cSld>
-  <p:clrMapOvr>
-    <a:masterClrMapping/>
-  </p:clrMapOvr>
-</p:sld>
-</file>
-
-<file path=ppt/slides/slide13.xml><?xml version="1.0" encoding="utf-8"?>
-<p:sld xmlns:a="http://schemas.openxmlformats.org/drawingml/2006/main" xmlns:r="http://schemas.openxmlformats.org/officeDocument/2006/relationships" xmlns:p="http://schemas.openxmlformats.org/presentationml/2006/main">
-  <p:cSld>
-    <p:spTree>
-      <p:nvGrpSpPr>
-        <p:cNvPr id="1" name=""/>
-        <p:cNvGrpSpPr/>
-        <p:nvPr/>
-      </p:nvGrpSpPr>
-      <p:grpSpPr>
-        <a:xfrm>
-          <a:off x="0" y="0"/>
-          <a:ext cx="0" cy="0"/>
-          <a:chOff x="0" y="0"/>
-          <a:chExt cx="0" cy="0"/>
-        </a:xfrm>
-      </p:grpSpPr>
-      <p:sp>
-        <p:nvSpPr>
-          <p:cNvPr id="2" name="Title 1"/>
-          <p:cNvSpPr>
-            <a:spLocks noGrp="1"/>
-          </p:cNvSpPr>
-          <p:nvPr>
-            <p:ph type="title"/>
-          </p:nvPr>
-        </p:nvSpPr>
-        <p:spPr/>
-        <p:txBody>
-          <a:bodyPr/>
-          <a:lstStyle/>
-          <a:p>
-            <a:r>
-              <a:rPr lang="en-US" dirty="0" smtClean="0"/>
-              <a:t>Entities Consist of:</a:t>
-            </a:r>
-            <a:endParaRPr lang="en-US" dirty="0"/>
-          </a:p>
-        </p:txBody>
-      </p:sp>
-      <p:sp>
-        <p:nvSpPr>
-          <p:cNvPr id="3" name="Content Placeholder 2"/>
-          <p:cNvSpPr>
-            <a:spLocks noGrp="1"/>
-          </p:cNvSpPr>
-          <p:nvPr>
-            <p:ph idx="1"/>
-          </p:nvPr>
-        </p:nvSpPr>
-        <p:spPr/>
-        <p:txBody>
-          <a:bodyPr/>
-          <a:lstStyle/>
-          <a:p>
-            <a:r>
-              <a:rPr lang="en-US" dirty="0" smtClean="0"/>
-              <a:t>Data Properties</a:t>
-            </a:r>
-          </a:p>
-          <a:p>
-            <a:r>
-              <a:rPr lang="en-US" dirty="0" smtClean="0"/>
-              <a:t>Navigation Properties</a:t>
-            </a:r>
-            <a:endParaRPr lang="en-US" dirty="0"/>
-          </a:p>
-        </p:txBody>
-      </p:sp>
-      <p:pic>
-        <p:nvPicPr>
-          <p:cNvPr id="4" name="Picture 3"/>
-          <p:cNvPicPr>
-            <a:picLocks noChangeAspect="1"/>
-          </p:cNvPicPr>
-          <p:nvPr/>
-        </p:nvPicPr>
-        <p:blipFill>
-          <a:blip r:embed="rId2"/>
-          <a:stretch>
-            <a:fillRect/>
-          </a:stretch>
-        </p:blipFill>
-        <p:spPr>
-          <a:xfrm>
-            <a:off x="4989174" y="1333500"/>
-            <a:ext cx="4010025" cy="5105400"/>
-          </a:xfrm>
-          <a:prstGeom prst="rect">
-            <a:avLst/>
-          </a:prstGeom>
-        </p:spPr>
-      </p:pic>
-    </p:spTree>
-    <p:extLst>
-      <p:ext uri="{BB962C8B-B14F-4D97-AF65-F5344CB8AC3E}">
-        <p14:creationId xmlns:p14="http://schemas.microsoft.com/office/powerpoint/2010/main" val="3330954134"/>
-      </p:ext>
-    </p:extLst>
-  </p:cSld>
-  <p:clrMapOvr>
-    <a:masterClrMapping/>
-  </p:clrMapOvr>
-</p:sld>
-</file>
-
-<file path=ppt/slides/slide14.xml><?xml version="1.0" encoding="utf-8"?>
-<p:sld xmlns:a="http://schemas.openxmlformats.org/drawingml/2006/main" xmlns:r="http://schemas.openxmlformats.org/officeDocument/2006/relationships" xmlns:p="http://schemas.openxmlformats.org/presentationml/2006/main">
-  <p:cSld>
-    <p:spTree>
-      <p:nvGrpSpPr>
-        <p:cNvPr id="1" name=""/>
-        <p:cNvGrpSpPr/>
-        <p:nvPr/>
-      </p:nvGrpSpPr>
-      <p:grpSpPr>
-        <a:xfrm>
-          <a:off x="0" y="0"/>
-          <a:ext cx="0" cy="0"/>
-          <a:chOff x="0" y="0"/>
-          <a:chExt cx="0" cy="0"/>
-        </a:xfrm>
-      </p:grpSpPr>
-      <p:sp>
-        <p:nvSpPr>
-          <p:cNvPr id="2" name="Title 1"/>
-          <p:cNvSpPr>
-            <a:spLocks noGrp="1"/>
-          </p:cNvSpPr>
-          <p:nvPr>
-            <p:ph type="title"/>
-          </p:nvPr>
-        </p:nvSpPr>
-        <p:spPr/>
-        <p:txBody>
-          <a:bodyPr/>
-          <a:lstStyle/>
-          <a:p>
-            <a:r>
-              <a:rPr lang="en-US" dirty="0" smtClean="0"/>
-              <a:t>The model class</a:t>
-            </a:r>
-            <a:endParaRPr lang="en-US" dirty="0"/>
-          </a:p>
-        </p:txBody>
-      </p:sp>
-      <p:sp>
-        <p:nvSpPr>
-          <p:cNvPr id="3" name="Content Placeholder 2"/>
-          <p:cNvSpPr>
-            <a:spLocks noGrp="1"/>
-          </p:cNvSpPr>
-          <p:nvPr>
-            <p:ph idx="1"/>
-          </p:nvPr>
-        </p:nvSpPr>
-        <p:spPr/>
-        <p:txBody>
-          <a:bodyPr/>
-          <a:lstStyle/>
-          <a:p>
-            <a:r>
-              <a:rPr lang="en-US" dirty="0" smtClean="0"/>
-              <a:t>*.</a:t>
-            </a:r>
-            <a:r>
-              <a:rPr lang="en-US" dirty="0" err="1" smtClean="0"/>
-              <a:t>edmx</a:t>
-            </a:r>
-            <a:r>
-              <a:rPr lang="en-US" dirty="0" smtClean="0"/>
-              <a:t> file</a:t>
-            </a:r>
-          </a:p>
-          <a:p>
-            <a:r>
-              <a:rPr lang="en-US" dirty="0" smtClean="0"/>
-              <a:t>*.</a:t>
-            </a:r>
-            <a:r>
-              <a:rPr lang="en-US" dirty="0" err="1" smtClean="0"/>
-              <a:t>tt</a:t>
-            </a:r>
-            <a:r>
-              <a:rPr lang="en-US" dirty="0" smtClean="0"/>
-              <a:t> files</a:t>
-            </a:r>
-          </a:p>
-          <a:p>
-            <a:pPr lvl="1"/>
-            <a:r>
-              <a:rPr lang="en-US" dirty="0" smtClean="0"/>
-              <a:t>Model.context.tt</a:t>
-            </a:r>
-          </a:p>
-          <a:p>
-            <a:pPr lvl="1"/>
-            <a:r>
-              <a:rPr lang="en-US" dirty="0" smtClean="0"/>
-              <a:t>Model.tt</a:t>
-            </a:r>
-          </a:p>
-          <a:p>
-            <a:r>
-              <a:rPr lang="en-US" dirty="0" smtClean="0"/>
-              <a:t>Context object in </a:t>
-            </a:r>
-            <a:r>
-              <a:rPr lang="en-US" dirty="0" err="1" smtClean="0"/>
-              <a:t>Model.Context.cs</a:t>
-            </a:r>
-            <a:r>
-              <a:rPr lang="en-US" dirty="0" smtClean="0"/>
-              <a:t> (generated)</a:t>
-            </a:r>
-          </a:p>
-          <a:p>
-            <a:r>
-              <a:rPr lang="en-US" dirty="0" err="1" smtClean="0"/>
-              <a:t>Model.edmx.diagram</a:t>
-            </a:r>
-            <a:endParaRPr lang="en-US" dirty="0" smtClean="0"/>
-          </a:p>
-          <a:p>
-            <a:r>
-              <a:rPr lang="en-US" smtClean="0"/>
-              <a:t>Model.edmx.diagram</a:t>
-            </a:r>
-            <a:endParaRPr lang="en-US" dirty="0"/>
-          </a:p>
-        </p:txBody>
-      </p:sp>
-    </p:spTree>
-    <p:extLst>
-      <p:ext uri="{BB962C8B-B14F-4D97-AF65-F5344CB8AC3E}">
-        <p14:creationId xmlns:p14="http://schemas.microsoft.com/office/powerpoint/2010/main" val="4030993022"/>
-      </p:ext>
-    </p:extLst>
-  </p:cSld>
-  <p:clrMapOvr>
-    <a:masterClrMapping/>
-  </p:clrMapOvr>
-</p:sld>
-</file>
-
-<file path=ppt/slides/slide15.xml><?xml version="1.0" encoding="utf-8"?>
-<p:sld xmlns:a="http://schemas.openxmlformats.org/drawingml/2006/main" xmlns:r="http://schemas.openxmlformats.org/officeDocument/2006/relationships" xmlns:p="http://schemas.openxmlformats.org/presentationml/2006/main">
-  <p:cSld>
-    <p:spTree>
-      <p:nvGrpSpPr>
-        <p:cNvPr id="1" name=""/>
-        <p:cNvGrpSpPr/>
-        <p:nvPr/>
-      </p:nvGrpSpPr>
-      <p:grpSpPr>
-        <a:xfrm>
-          <a:off x="0" y="0"/>
-          <a:ext cx="0" cy="0"/>
-          <a:chOff x="0" y="0"/>
-          <a:chExt cx="0" cy="0"/>
-        </a:xfrm>
-      </p:grpSpPr>
-      <p:sp>
-        <p:nvSpPr>
-          <p:cNvPr id="2" name="Title 1"/>
-          <p:cNvSpPr>
-            <a:spLocks noGrp="1"/>
-          </p:cNvSpPr>
-          <p:nvPr>
-            <p:ph type="title"/>
-          </p:nvPr>
-        </p:nvSpPr>
-        <p:spPr/>
-        <p:txBody>
-          <a:bodyPr/>
-          <a:lstStyle/>
-          <a:p>
-            <a:r>
-              <a:rPr lang="en-US" dirty="0" smtClean="0"/>
-              <a:t>Table mappings</a:t>
-            </a:r>
-            <a:endParaRPr lang="en-US" dirty="0"/>
-          </a:p>
-        </p:txBody>
-      </p:sp>
-      <p:pic>
-        <p:nvPicPr>
-          <p:cNvPr id="5" name="Picture 4"/>
-          <p:cNvPicPr>
-            <a:picLocks noChangeAspect="1"/>
-          </p:cNvPicPr>
-          <p:nvPr/>
-        </p:nvPicPr>
-        <p:blipFill>
-          <a:blip r:embed="rId2"/>
-          <a:stretch>
-            <a:fillRect/>
-          </a:stretch>
-        </p:blipFill>
-        <p:spPr>
-          <a:xfrm>
-            <a:off x="895350" y="1892536"/>
-            <a:ext cx="7353300" cy="4162425"/>
-          </a:xfrm>
-          <a:prstGeom prst="rect">
-            <a:avLst/>
-          </a:prstGeom>
-        </p:spPr>
-      </p:pic>
-    </p:spTree>
-    <p:extLst>
-      <p:ext uri="{BB962C8B-B14F-4D97-AF65-F5344CB8AC3E}">
-        <p14:creationId xmlns:p14="http://schemas.microsoft.com/office/powerpoint/2010/main" val="774898647"/>
-      </p:ext>
-    </p:extLst>
-  </p:cSld>
-  <p:clrMapOvr>
-    <a:masterClrMapping/>
-  </p:clrMapOvr>
-</p:sld>
-</file>
-
-<file path=ppt/slides/slide16.xml><?xml version="1.0" encoding="utf-8"?>
-<p:sld xmlns:a="http://schemas.openxmlformats.org/drawingml/2006/main" xmlns:r="http://schemas.openxmlformats.org/officeDocument/2006/relationships" xmlns:p="http://schemas.openxmlformats.org/presentationml/2006/main">
-  <p:cSld>
-    <p:spTree>
-      <p:nvGrpSpPr>
-        <p:cNvPr id="1" name=""/>
-        <p:cNvGrpSpPr/>
-        <p:nvPr/>
-      </p:nvGrpSpPr>
-      <p:grpSpPr>
-        <a:xfrm>
-          <a:off x="0" y="0"/>
-          <a:ext cx="0" cy="0"/>
-          <a:chOff x="0" y="0"/>
-          <a:chExt cx="0" cy="0"/>
-        </a:xfrm>
-      </p:grpSpPr>
-      <p:sp>
-        <p:nvSpPr>
-          <p:cNvPr id="2" name="Title 1"/>
-          <p:cNvSpPr>
-            <a:spLocks noGrp="1"/>
-          </p:cNvSpPr>
-          <p:nvPr>
-            <p:ph type="title"/>
-          </p:nvPr>
-        </p:nvSpPr>
-        <p:spPr/>
-        <p:txBody>
-          <a:bodyPr/>
-          <a:lstStyle/>
-          <a:p>
-            <a:r>
-              <a:rPr lang="en-US" dirty="0" err="1" smtClean="0"/>
-              <a:t>Sproc</a:t>
-            </a:r>
-            <a:r>
-              <a:rPr lang="en-US" dirty="0" smtClean="0"/>
-              <a:t> Mappings</a:t>
-            </a:r>
-            <a:endParaRPr lang="en-US" dirty="0"/>
-          </a:p>
-        </p:txBody>
-      </p:sp>
-      <p:pic>
-        <p:nvPicPr>
-          <p:cNvPr id="4" name="Picture 3"/>
-          <p:cNvPicPr>
-            <a:picLocks noChangeAspect="1"/>
-          </p:cNvPicPr>
-          <p:nvPr/>
-        </p:nvPicPr>
-        <p:blipFill>
-          <a:blip r:embed="rId2"/>
-          <a:stretch>
-            <a:fillRect/>
-          </a:stretch>
-        </p:blipFill>
-        <p:spPr>
-          <a:xfrm>
-            <a:off x="895350" y="1921719"/>
-            <a:ext cx="7353300" cy="4162425"/>
-          </a:xfrm>
-          <a:prstGeom prst="rect">
-            <a:avLst/>
-          </a:prstGeom>
-        </p:spPr>
-      </p:pic>
-    </p:spTree>
-    <p:extLst>
-      <p:ext uri="{BB962C8B-B14F-4D97-AF65-F5344CB8AC3E}">
-        <p14:creationId xmlns:p14="http://schemas.microsoft.com/office/powerpoint/2010/main" val="2479829221"/>
-      </p:ext>
-    </p:extLst>
-  </p:cSld>
-  <p:clrMapOvr>
-    <a:masterClrMapping/>
-  </p:clrMapOvr>
-</p:sld>
-</file>
-
-<file path=ppt/slides/slide17.xml><?xml version="1.0" encoding="utf-8"?>
-<p:sld xmlns:a="http://schemas.openxmlformats.org/drawingml/2006/main" xmlns:r="http://schemas.openxmlformats.org/officeDocument/2006/relationships" xmlns:p="http://schemas.openxmlformats.org/presentationml/2006/main">
-  <p:cSld>
-    <p:spTree>
-      <p:nvGrpSpPr>
-        <p:cNvPr id="1" name=""/>
-        <p:cNvGrpSpPr/>
-        <p:nvPr/>
-      </p:nvGrpSpPr>
-      <p:grpSpPr>
-        <a:xfrm>
-          <a:off x="0" y="0"/>
-          <a:ext cx="0" cy="0"/>
-          <a:chOff x="0" y="0"/>
-          <a:chExt cx="0" cy="0"/>
-        </a:xfrm>
-      </p:grpSpPr>
-      <p:sp>
-        <p:nvSpPr>
-          <p:cNvPr id="2" name="Title 1"/>
-          <p:cNvSpPr>
-            <a:spLocks noGrp="1"/>
-          </p:cNvSpPr>
-          <p:nvPr>
-            <p:ph type="title"/>
-          </p:nvPr>
-        </p:nvSpPr>
-        <p:spPr/>
-        <p:txBody>
-          <a:bodyPr/>
-          <a:lstStyle/>
-          <a:p>
-            <a:r>
-              <a:rPr lang="en-US" dirty="0" smtClean="0"/>
-              <a:t>Create a Runner</a:t>
-            </a:r>
-            <a:endParaRPr lang="en-US" dirty="0"/>
-          </a:p>
-        </p:txBody>
-      </p:sp>
-      <p:pic>
-        <p:nvPicPr>
-          <p:cNvPr id="9" name="Picture 8"/>
-          <p:cNvPicPr>
-            <a:picLocks noChangeAspect="1"/>
-          </p:cNvPicPr>
-          <p:nvPr/>
-        </p:nvPicPr>
-        <p:blipFill>
-          <a:blip r:embed="rId2"/>
-          <a:stretch>
-            <a:fillRect/>
-          </a:stretch>
-        </p:blipFill>
-        <p:spPr>
-          <a:xfrm>
-            <a:off x="773605" y="1690689"/>
-            <a:ext cx="6877705" cy="4753178"/>
-          </a:xfrm>
-          <a:prstGeom prst="rect">
-            <a:avLst/>
-          </a:prstGeom>
-        </p:spPr>
-      </p:pic>
-    </p:spTree>
-    <p:extLst>
-      <p:ext uri="{BB962C8B-B14F-4D97-AF65-F5344CB8AC3E}">
-        <p14:creationId xmlns:p14="http://schemas.microsoft.com/office/powerpoint/2010/main" val="3127331328"/>
-      </p:ext>
-    </p:extLst>
-  </p:cSld>
-  <p:clrMapOvr>
-    <a:masterClrMapping/>
-  </p:clrMapOvr>
-</p:sld>
-</file>
-
-<file path=ppt/slides/slide18.xml><?xml version="1.0" encoding="utf-8"?>
-<p:sld xmlns:a="http://schemas.openxmlformats.org/drawingml/2006/main" xmlns:r="http://schemas.openxmlformats.org/officeDocument/2006/relationships" xmlns:p="http://schemas.openxmlformats.org/presentationml/2006/main">
-  <p:cSld>
-    <p:spTree>
-      <p:nvGrpSpPr>
-        <p:cNvPr id="1" name=""/>
-        <p:cNvGrpSpPr/>
-        <p:nvPr/>
-      </p:nvGrpSpPr>
-      <p:grpSpPr>
-        <a:xfrm>
-          <a:off x="0" y="0"/>
-          <a:ext cx="0" cy="0"/>
-          <a:chOff x="0" y="0"/>
-          <a:chExt cx="0" cy="0"/>
-        </a:xfrm>
-      </p:grpSpPr>
-      <p:sp>
-        <p:nvSpPr>
-          <p:cNvPr id="2" name="Title 1"/>
-          <p:cNvSpPr>
-            <a:spLocks noGrp="1"/>
-          </p:cNvSpPr>
-          <p:nvPr>
-            <p:ph type="title"/>
-          </p:nvPr>
-        </p:nvSpPr>
-        <p:spPr/>
-        <p:txBody>
-          <a:bodyPr/>
-          <a:lstStyle/>
-          <a:p>
-            <a:r>
-              <a:rPr lang="en-US" smtClean="0"/>
-              <a:t>Reference EF</a:t>
-            </a:r>
-            <a:endParaRPr lang="en-US"/>
-          </a:p>
-        </p:txBody>
-      </p:sp>
-      <p:pic>
-        <p:nvPicPr>
-          <p:cNvPr id="4" name="Picture 3"/>
-          <p:cNvPicPr>
-            <a:picLocks noChangeAspect="1"/>
-          </p:cNvPicPr>
-          <p:nvPr/>
-        </p:nvPicPr>
-        <p:blipFill>
-          <a:blip r:embed="rId2"/>
-          <a:stretch>
-            <a:fillRect/>
-          </a:stretch>
-        </p:blipFill>
-        <p:spPr>
-          <a:xfrm>
-            <a:off x="1342416" y="1669310"/>
-            <a:ext cx="6774200" cy="4645166"/>
-          </a:xfrm>
-          <a:prstGeom prst="rect">
-            <a:avLst/>
-          </a:prstGeom>
-        </p:spPr>
-      </p:pic>
-    </p:spTree>
-    <p:extLst>
-      <p:ext uri="{BB962C8B-B14F-4D97-AF65-F5344CB8AC3E}">
-        <p14:creationId xmlns:p14="http://schemas.microsoft.com/office/powerpoint/2010/main" val="2397764835"/>
-      </p:ext>
-    </p:extLst>
-  </p:cSld>
-  <p:clrMapOvr>
-    <a:masterClrMapping/>
-  </p:clrMapOvr>
-</p:sld>
-</file>
-
-<file path=ppt/slides/slide19.xml><?xml version="1.0" encoding="utf-8"?>
-<p:sld xmlns:a="http://schemas.openxmlformats.org/drawingml/2006/main" xmlns:r="http://schemas.openxmlformats.org/officeDocument/2006/relationships" xmlns:p="http://schemas.openxmlformats.org/presentationml/2006/main">
-  <p:cSld>
-    <p:spTree>
-      <p:nvGrpSpPr>
-        <p:cNvPr id="1" name=""/>
-        <p:cNvGrpSpPr/>
-        <p:nvPr/>
-      </p:nvGrpSpPr>
-      <p:grpSpPr>
-        <a:xfrm>
-          <a:off x="0" y="0"/>
-          <a:ext cx="0" cy="0"/>
-          <a:chOff x="0" y="0"/>
-          <a:chExt cx="0" cy="0"/>
-        </a:xfrm>
-      </p:grpSpPr>
-      <p:sp>
-        <p:nvSpPr>
-          <p:cNvPr id="2" name="Title 1"/>
-          <p:cNvSpPr>
-            <a:spLocks noGrp="1"/>
-          </p:cNvSpPr>
-          <p:nvPr>
-            <p:ph type="title"/>
-          </p:nvPr>
-        </p:nvSpPr>
-        <p:spPr/>
-        <p:txBody>
-          <a:bodyPr/>
-          <a:lstStyle/>
-          <a:p>
-            <a:r>
-              <a:rPr lang="en-US" dirty="0" smtClean="0"/>
-              <a:t>Query Employees</a:t>
-            </a:r>
-            <a:endParaRPr lang="en-US" dirty="0"/>
-          </a:p>
-        </p:txBody>
-      </p:sp>
-      <p:sp>
-        <p:nvSpPr>
-          <p:cNvPr id="3" name="Content Placeholder 2"/>
-          <p:cNvSpPr>
-            <a:spLocks noGrp="1"/>
-          </p:cNvSpPr>
-          <p:nvPr>
-            <p:ph idx="1"/>
-          </p:nvPr>
-        </p:nvSpPr>
-        <p:spPr/>
-        <p:txBody>
-          <a:bodyPr/>
-          <a:lstStyle/>
-          <a:p>
-            <a:endParaRPr lang="en-US"/>
-          </a:p>
-        </p:txBody>
-      </p:sp>
-    </p:spTree>
-    <p:extLst>
-      <p:ext uri="{BB962C8B-B14F-4D97-AF65-F5344CB8AC3E}">
-        <p14:creationId xmlns:p14="http://schemas.microsoft.com/office/powerpoint/2010/main" val="2639347550"/>
-      </p:ext>
-    </p:extLst>
-  </p:cSld>
-  <p:clrMapOvr>
-    <a:masterClrMapping/>
-  </p:clrMapOvr>
-</p:sld>
-</file>
-
-<file path=ppt/slides/slide2.xml><?xml version="1.0" encoding="utf-8"?>
-<p:sld xmlns:a="http://schemas.openxmlformats.org/drawingml/2006/main" xmlns:r="http://schemas.openxmlformats.org/officeDocument/2006/relationships" xmlns:p="http://schemas.openxmlformats.org/presentationml/2006/main">
-  <p:cSld>
-    <p:spTree>
-      <p:nvGrpSpPr>
-        <p:cNvPr id="1" name=""/>
-        <p:cNvGrpSpPr/>
-        <p:nvPr/>
-      </p:nvGrpSpPr>
-      <p:grpSpPr>
-        <a:xfrm>
-          <a:off x="0" y="0"/>
-          <a:ext cx="0" cy="0"/>
-          <a:chOff x="0" y="0"/>
-          <a:chExt cx="0" cy="0"/>
-        </a:xfrm>
-      </p:grpSpPr>
-      <p:sp>
-        <p:nvSpPr>
-          <p:cNvPr id="2" name="Title 1"/>
-          <p:cNvSpPr>
-            <a:spLocks noGrp="1"/>
-          </p:cNvSpPr>
-          <p:nvPr>
-            <p:ph type="ctrTitle"/>
-          </p:nvPr>
-        </p:nvSpPr>
-        <p:spPr/>
-        <p:txBody>
-          <a:bodyPr/>
-          <a:lstStyle/>
-          <a:p>
-            <a:r>
               <a:rPr lang="en-US" dirty="0" smtClean="0"/>
               <a:t>Entity Framework</a:t>
             </a:r>
@@ -4102,7 +3065,7 @@
 </p:sld>
 </file>
 
-<file path=ppt/slides/slide20.xml><?xml version="1.0" encoding="utf-8"?>
+<file path=ppt/slides/slide10.xml><?xml version="1.0" encoding="utf-8"?>
 <p:sld xmlns:a="http://schemas.openxmlformats.org/drawingml/2006/main" xmlns:r="http://schemas.openxmlformats.org/officeDocument/2006/relationships" xmlns:p="http://schemas.openxmlformats.org/presentationml/2006/main">
   <p:cSld>
     <p:spTree>
@@ -4135,8 +3098,8 @@
           <a:lstStyle/>
           <a:p>
             <a:r>
-              <a:rPr lang="da-DK" dirty="0" smtClean="0"/>
-              <a:t>Entity in the designer</a:t>
+              <a:rPr lang="en-US" dirty="0" smtClean="0"/>
+              <a:t>Update model from DB</a:t>
             </a:r>
             <a:endParaRPr lang="en-US" dirty="0"/>
           </a:p>
@@ -4158,166 +3121,60 @@
           <a:lstStyle/>
           <a:p>
             <a:r>
+              <a:rPr lang="en-US" dirty="0" smtClean="0"/>
+              <a:t>Add a column to a table</a:t>
+            </a:r>
+          </a:p>
+          <a:p>
+            <a:r>
+              <a:rPr lang="en-US" dirty="0" smtClean="0"/>
+              <a:t>Add new table</a:t>
+            </a:r>
+          </a:p>
+          <a:p>
+            <a:r>
+              <a:rPr lang="en-US" dirty="0" smtClean="0"/>
+              <a:t>Update model from </a:t>
+            </a:r>
+            <a:r>
               <a:rPr lang="en-US" dirty="0" err="1" smtClean="0"/>
-              <a:t>Singularization</a:t>
-            </a:r>
-            <a:r>
-              <a:rPr lang="en-US" dirty="0" smtClean="0"/>
-              <a:t> and </a:t>
-            </a:r>
-            <a:r>
-              <a:rPr lang="en-US" dirty="0" err="1"/>
-              <a:t>p</a:t>
-            </a:r>
-            <a:r>
-              <a:rPr lang="en-US" dirty="0" err="1" smtClean="0"/>
-              <a:t>luralization</a:t>
-            </a:r>
-            <a:r>
-              <a:rPr lang="en-US" dirty="0" smtClean="0"/>
-              <a:t>: </a:t>
+              <a:t>db</a:t>
+            </a:r>
+            <a:r>
+              <a:rPr lang="en-US" dirty="0" smtClean="0"/>
+              <a:t> option</a:t>
+            </a:r>
+          </a:p>
+          <a:p>
+            <a:r>
+              <a:rPr lang="en-US" dirty="0" smtClean="0"/>
+              <a:t>Designer will not alter or remove existing properties</a:t>
             </a:r>
           </a:p>
           <a:p>
             <a:pPr lvl="1"/>
             <a:r>
               <a:rPr lang="en-US" dirty="0" smtClean="0"/>
-              <a:t>The ‘many’ part is named in plural, e.g. Orders</a:t>
+              <a:t>Validate model will show this</a:t>
             </a:r>
           </a:p>
           <a:p>
             <a:pPr lvl="1"/>
             <a:r>
-              <a:rPr lang="da-DK" dirty="0" smtClean="0"/>
-              <a:t>The ‘one’ part is named in single, e.g. Customer</a:t>
-            </a:r>
-          </a:p>
-          <a:p>
-            <a:r>
-              <a:rPr lang="da-DK" dirty="0" smtClean="0"/>
-              <a:t>Navigation Properties:</a:t>
+              <a:rPr lang="en-US" dirty="0" smtClean="0"/>
+              <a:t>Change property type manually</a:t>
             </a:r>
           </a:p>
           <a:p>
             <a:pPr lvl="1"/>
-            <a:r>
-              <a:rPr lang="da-DK" dirty="0" smtClean="0"/>
-              <a:t>Make it possible to navigate from one entity (in code an object) to another.</a:t>
-            </a:r>
             <a:endParaRPr lang="en-US" dirty="0"/>
           </a:p>
         </p:txBody>
       </p:sp>
-      <p:sp>
-        <p:nvSpPr>
-          <p:cNvPr id="4" name="Footer Placeholder 3"/>
-          <p:cNvSpPr>
-            <a:spLocks noGrp="1"/>
-          </p:cNvSpPr>
-          <p:nvPr>
-            <p:ph type="ftr" sz="quarter" idx="11"/>
-          </p:nvPr>
-        </p:nvSpPr>
-        <p:spPr/>
-        <p:txBody>
-          <a:bodyPr/>
-          <a:lstStyle/>
-          <a:p>
-            <a:endParaRPr lang="da-DK"/>
-          </a:p>
-        </p:txBody>
-      </p:sp>
-      <p:sp>
-        <p:nvSpPr>
-          <p:cNvPr id="5" name="Slide Number Placeholder 4"/>
-          <p:cNvSpPr>
-            <a:spLocks noGrp="1"/>
-          </p:cNvSpPr>
-          <p:nvPr>
-            <p:ph type="sldNum" sz="quarter" idx="12"/>
-          </p:nvPr>
-        </p:nvSpPr>
-        <p:spPr/>
-        <p:txBody>
-          <a:bodyPr/>
-          <a:lstStyle/>
-          <a:p>
-            <a:fld id="{F7AB382F-E9E6-CE49-B414-1E064FB7F064}" type="slidenum">
-              <a:rPr lang="da-DK" smtClean="0"/>
-              <a:t>20</a:t>
-            </a:fld>
-            <a:endParaRPr lang="da-DK"/>
-          </a:p>
-        </p:txBody>
-      </p:sp>
-      <p:pic>
-        <p:nvPicPr>
-          <p:cNvPr id="6146" name="Picture 2"/>
-          <p:cNvPicPr>
-            <a:picLocks noChangeAspect="1" noChangeArrowheads="1"/>
-          </p:cNvPicPr>
-          <p:nvPr/>
-        </p:nvPicPr>
-        <p:blipFill>
-          <a:blip r:embed="rId2">
-            <a:extLst>
-              <a:ext uri="{28A0092B-C50C-407E-A947-70E740481C1C}">
-                <a14:useLocalDpi xmlns:a14="http://schemas.microsoft.com/office/drawing/2010/main" val="0"/>
-              </a:ext>
-            </a:extLst>
-          </a:blip>
-          <a:srcRect/>
-          <a:stretch>
-            <a:fillRect/>
-          </a:stretch>
-        </p:blipFill>
-        <p:spPr bwMode="auto">
-          <a:xfrm>
-            <a:off x="4256358" y="3946291"/>
-            <a:ext cx="4060284" cy="2592622"/>
-          </a:xfrm>
-          <a:prstGeom prst="rect">
-            <a:avLst/>
-          </a:prstGeom>
-          <a:noFill/>
-          <a:ln>
-            <a:noFill/>
-          </a:ln>
-          <a:effectLst/>
-          <a:extLst>
-            <a:ext uri="{909E8E84-426E-40DD-AFC4-6F175D3DCCD1}">
-              <a14:hiddenFill xmlns:a14="http://schemas.microsoft.com/office/drawing/2010/main">
-                <a:solidFill>
-                  <a:schemeClr val="accent1"/>
-                </a:solidFill>
-              </a14:hiddenFill>
-            </a:ext>
-            <a:ext uri="{91240B29-F687-4F45-9708-019B960494DF}">
-              <a14:hiddenLine xmlns:a14="http://schemas.microsoft.com/office/drawing/2010/main" w="9525">
-                <a:solidFill>
-                  <a:schemeClr val="tx1"/>
-                </a:solidFill>
-                <a:miter lim="800000"/>
-                <a:headEnd/>
-                <a:tailEnd/>
-              </a14:hiddenLine>
-            </a:ext>
-            <a:ext uri="{AF507438-7753-43E0-B8FC-AC1667EBCBE1}">
-              <a14:hiddenEffects xmlns:a14="http://schemas.microsoft.com/office/drawing/2010/main">
-                <a:effectLst>
-                  <a:outerShdw dist="35921" dir="2700000" algn="ctr" rotWithShape="0">
-                    <a:schemeClr val="bg2"/>
-                  </a:outerShdw>
-                </a:effectLst>
-              </a14:hiddenEffects>
-            </a:ext>
-          </a:extLst>
-        </p:spPr>
-      </p:pic>
     </p:spTree>
     <p:extLst>
       <p:ext uri="{BB962C8B-B14F-4D97-AF65-F5344CB8AC3E}">
-        <p14:creationId xmlns:p14="http://schemas.microsoft.com/office/powerpoint/2010/main" val="3475908334"/>
+        <p14:creationId xmlns:p14="http://schemas.microsoft.com/office/powerpoint/2010/main" val="450648319"/>
       </p:ext>
     </p:extLst>
   </p:cSld>
@@ -4327,7 +3184,7 @@
 </p:sld>
 </file>
 
-<file path=ppt/slides/slide21.xml><?xml version="1.0" encoding="utf-8"?>
+<file path=ppt/slides/slide11.xml><?xml version="1.0" encoding="utf-8"?>
 <p:sld xmlns:a="http://schemas.openxmlformats.org/drawingml/2006/main" xmlns:r="http://schemas.openxmlformats.org/officeDocument/2006/relationships" xmlns:p="http://schemas.openxmlformats.org/presentationml/2006/main">
   <p:cSld>
     <p:spTree>
@@ -4359,6 +3216,10 @@
           <a:bodyPr/>
           <a:lstStyle/>
           <a:p>
+            <a:r>
+              <a:rPr lang="en-US" smtClean="0"/>
+              <a:t>Summary</a:t>
+            </a:r>
             <a:endParaRPr lang="en-US"/>
           </a:p>
         </p:txBody>
@@ -4378,14 +3239,26 @@
           <a:bodyPr/>
           <a:lstStyle/>
           <a:p>
-            <a:endParaRPr lang="en-US"/>
+            <a:r>
+              <a:rPr lang="en-US" dirty="0" smtClean="0"/>
+              <a:t>Saw how to import a database model</a:t>
+            </a:r>
+          </a:p>
+          <a:p>
+            <a:r>
+              <a:rPr lang="en-US" dirty="0" smtClean="0"/>
+              <a:t>Examined the generated content</a:t>
+            </a:r>
+          </a:p>
+          <a:p>
+            <a:endParaRPr lang="en-US" dirty="0"/>
           </a:p>
         </p:txBody>
       </p:sp>
     </p:spTree>
     <p:extLst>
       <p:ext uri="{BB962C8B-B14F-4D97-AF65-F5344CB8AC3E}">
-        <p14:creationId xmlns:p14="http://schemas.microsoft.com/office/powerpoint/2010/main" val="3167342611"/>
+        <p14:creationId xmlns:p14="http://schemas.microsoft.com/office/powerpoint/2010/main" val="4082111346"/>
       </p:ext>
     </p:extLst>
   </p:cSld>
@@ -4395,7 +3268,7 @@
 </p:sld>
 </file>
 
-<file path=ppt/slides/slide22.xml><?xml version="1.0" encoding="utf-8"?>
+<file path=ppt/slides/slide12.xml><?xml version="1.0" encoding="utf-8"?>
 <p:sld xmlns:a="http://schemas.openxmlformats.org/drawingml/2006/main" xmlns:r="http://schemas.openxmlformats.org/officeDocument/2006/relationships" xmlns:p="http://schemas.openxmlformats.org/presentationml/2006/main">
   <p:cSld>
     <p:spTree>
@@ -4429,7 +3302,7 @@
           <a:p>
             <a:r>
               <a:rPr lang="en-US" dirty="0" smtClean="0"/>
-              <a:t>Diagramming</a:t>
+              <a:t>Lab: Create model from database</a:t>
             </a:r>
             <a:endParaRPr lang="en-US" dirty="0"/>
           </a:p>
@@ -4437,7 +3310,7 @@
       </p:sp>
       <p:sp>
         <p:nvSpPr>
-          <p:cNvPr id="3" name="Content Placeholder 2"/>
+          <p:cNvPr id="4" name="Content Placeholder 3"/>
           <p:cNvSpPr>
             <a:spLocks noGrp="1"/>
           </p:cNvSpPr>
@@ -4449,24 +3322,6 @@
         <p:txBody>
           <a:bodyPr/>
           <a:lstStyle/>
-          <a:p>
-            <a:r>
-              <a:rPr lang="en-US" dirty="0" smtClean="0"/>
-              <a:t>Create new and add entities</a:t>
-            </a:r>
-          </a:p>
-          <a:p>
-            <a:r>
-              <a:rPr lang="en-US" dirty="0" smtClean="0"/>
-              <a:t>Removing items from a diagram</a:t>
-            </a:r>
-          </a:p>
-          <a:p>
-            <a:r>
-              <a:rPr lang="en-US" dirty="0" smtClean="0"/>
-              <a:t>Create new diagram from selected entities</a:t>
-            </a:r>
-          </a:p>
           <a:p>
             <a:endParaRPr lang="en-US" dirty="0"/>
           </a:p>
@@ -4475,7 +3330,7 @@
     </p:spTree>
     <p:extLst>
       <p:ext uri="{BB962C8B-B14F-4D97-AF65-F5344CB8AC3E}">
-        <p14:creationId xmlns:p14="http://schemas.microsoft.com/office/powerpoint/2010/main" val="507314310"/>
+        <p14:creationId xmlns:p14="http://schemas.microsoft.com/office/powerpoint/2010/main" val="1874241560"/>
       </p:ext>
     </p:extLst>
   </p:cSld>
@@ -4485,7 +3340,7 @@
 </p:sld>
 </file>
 
-<file path=ppt/slides/slide23.xml><?xml version="1.0" encoding="utf-8"?>
+<file path=ppt/slides/slide2.xml><?xml version="1.0" encoding="utf-8"?>
 <p:sld xmlns:a="http://schemas.openxmlformats.org/drawingml/2006/main" xmlns:r="http://schemas.openxmlformats.org/officeDocument/2006/relationships" xmlns:p="http://schemas.openxmlformats.org/presentationml/2006/main">
   <p:cSld>
     <p:spTree>
@@ -4519,7 +3374,7 @@
           <a:p>
             <a:r>
               <a:rPr lang="en-US" dirty="0" smtClean="0"/>
-              <a:t>Update model from DB</a:t>
+              <a:t>What and Why Database First?</a:t>
             </a:r>
             <a:endParaRPr lang="en-US" dirty="0"/>
           </a:p>
@@ -4542,51 +3397,49 @@
           <a:p>
             <a:r>
               <a:rPr lang="en-US" dirty="0" smtClean="0"/>
-              <a:t>Add a column to a table</a:t>
-            </a:r>
-          </a:p>
-          <a:p>
-            <a:r>
-              <a:rPr lang="en-US" dirty="0" smtClean="0"/>
-              <a:t>Add new table</a:t>
-            </a:r>
-          </a:p>
-          <a:p>
-            <a:r>
-              <a:rPr lang="en-US" dirty="0" smtClean="0"/>
-              <a:t>Update model from </a:t>
-            </a:r>
-            <a:r>
-              <a:rPr lang="en-US" dirty="0" err="1" smtClean="0"/>
-              <a:t>db</a:t>
-            </a:r>
-            <a:r>
-              <a:rPr lang="en-US" dirty="0" smtClean="0"/>
-              <a:t> option</a:t>
-            </a:r>
-          </a:p>
-          <a:p>
-            <a:r>
-              <a:rPr lang="en-US" dirty="0" smtClean="0"/>
-              <a:t>Designer will not alter or remove existing properties</a:t>
+              <a:t>The database already exists</a:t>
+            </a:r>
+          </a:p>
+          <a:p>
+            <a:r>
+              <a:rPr lang="en-US" dirty="0" smtClean="0"/>
+              <a:t>You want low level control of the database</a:t>
+            </a:r>
+          </a:p>
+          <a:p>
+            <a:r>
+              <a:rPr lang="en-US" dirty="0" smtClean="0"/>
+              <a:t>DB is managed by DBA’s</a:t>
+            </a:r>
+          </a:p>
+          <a:p>
+            <a:endParaRPr lang="en-US" dirty="0"/>
+          </a:p>
+          <a:p>
+            <a:r>
+              <a:rPr lang="en-US" dirty="0" smtClean="0"/>
+              <a:t>Model changes are made in the database</a:t>
             </a:r>
           </a:p>
           <a:p>
             <a:pPr lvl="1"/>
             <a:r>
               <a:rPr lang="en-US" dirty="0" smtClean="0"/>
-              <a:t>Validate model will show this</a:t>
+              <a:t>Updated in the designer</a:t>
+            </a:r>
+          </a:p>
+          <a:p>
+            <a:r>
+              <a:rPr lang="en-US" dirty="0" smtClean="0"/>
+              <a:t>Entire database can be generated from the model</a:t>
             </a:r>
           </a:p>
           <a:p>
             <a:pPr lvl="1"/>
             <a:r>
               <a:rPr lang="en-US" dirty="0" smtClean="0"/>
-              <a:t>Change property type manually</a:t>
-            </a:r>
-          </a:p>
-          <a:p>
-            <a:pPr lvl="1"/>
+              <a:t>Updates require a drop</a:t>
+            </a:r>
             <a:endParaRPr lang="en-US" dirty="0"/>
           </a:p>
         </p:txBody>
@@ -4594,600 +3447,7 @@
     </p:spTree>
     <p:extLst>
       <p:ext uri="{BB962C8B-B14F-4D97-AF65-F5344CB8AC3E}">
-        <p14:creationId xmlns:p14="http://schemas.microsoft.com/office/powerpoint/2010/main" val="450648319"/>
-      </p:ext>
-    </p:extLst>
-  </p:cSld>
-  <p:clrMapOvr>
-    <a:masterClrMapping/>
-  </p:clrMapOvr>
-</p:sld>
-</file>
-
-<file path=ppt/slides/slide24.xml><?xml version="1.0" encoding="utf-8"?>
-<p:sld xmlns:a="http://schemas.openxmlformats.org/drawingml/2006/main" xmlns:r="http://schemas.openxmlformats.org/officeDocument/2006/relationships" xmlns:p="http://schemas.openxmlformats.org/presentationml/2006/main">
-  <p:cSld>
-    <p:spTree>
-      <p:nvGrpSpPr>
-        <p:cNvPr id="1" name=""/>
-        <p:cNvGrpSpPr/>
-        <p:nvPr/>
-      </p:nvGrpSpPr>
-      <p:grpSpPr>
-        <a:xfrm>
-          <a:off x="0" y="0"/>
-          <a:ext cx="0" cy="0"/>
-          <a:chOff x="0" y="0"/>
-          <a:chExt cx="0" cy="0"/>
-        </a:xfrm>
-      </p:grpSpPr>
-      <p:sp>
-        <p:nvSpPr>
-          <p:cNvPr id="2" name="Title 1"/>
-          <p:cNvSpPr>
-            <a:spLocks noGrp="1"/>
-          </p:cNvSpPr>
-          <p:nvPr>
-            <p:ph type="title"/>
-          </p:nvPr>
-        </p:nvSpPr>
-        <p:spPr/>
-        <p:txBody>
-          <a:bodyPr/>
-          <a:lstStyle/>
-          <a:p>
-            <a:r>
-              <a:rPr lang="en-US" dirty="0" smtClean="0"/>
-              <a:t>Stored procedures</a:t>
-            </a:r>
-            <a:endParaRPr lang="en-US" dirty="0"/>
-          </a:p>
-        </p:txBody>
-      </p:sp>
-      <p:sp>
-        <p:nvSpPr>
-          <p:cNvPr id="3" name="Content Placeholder 2"/>
-          <p:cNvSpPr>
-            <a:spLocks noGrp="1"/>
-          </p:cNvSpPr>
-          <p:nvPr>
-            <p:ph idx="1"/>
-          </p:nvPr>
-        </p:nvSpPr>
-        <p:spPr/>
-        <p:txBody>
-          <a:bodyPr/>
-          <a:lstStyle/>
-          <a:p>
-            <a:r>
-              <a:rPr lang="en-US" dirty="0" smtClean="0"/>
-              <a:t>Show that function parameters are created</a:t>
-            </a:r>
-          </a:p>
-          <a:p>
-            <a:r>
-              <a:rPr lang="en-US" dirty="0"/>
-              <a:t>Results are complex types</a:t>
-            </a:r>
-          </a:p>
-          <a:p>
-            <a:pPr lvl="1"/>
-            <a:r>
-              <a:rPr lang="en-US" dirty="0" smtClean="0"/>
-              <a:t>Can remove to map to another entity</a:t>
-            </a:r>
-          </a:p>
-          <a:p>
-            <a:r>
-              <a:rPr lang="en-US" dirty="0" smtClean="0"/>
-              <a:t>Show how to reference but not create functions</a:t>
-            </a:r>
-          </a:p>
-          <a:p>
-            <a:r>
-              <a:rPr lang="en-US" dirty="0" smtClean="0"/>
-              <a:t>Show how to map functions like delete to stored </a:t>
-            </a:r>
-            <a:r>
-              <a:rPr lang="en-US" dirty="0" err="1" smtClean="0"/>
-              <a:t>procs</a:t>
-            </a:r>
-            <a:endParaRPr lang="en-US" dirty="0" smtClean="0"/>
-          </a:p>
-          <a:p>
-            <a:endParaRPr lang="en-US" dirty="0"/>
-          </a:p>
-        </p:txBody>
-      </p:sp>
-    </p:spTree>
-    <p:extLst>
-      <p:ext uri="{BB962C8B-B14F-4D97-AF65-F5344CB8AC3E}">
-        <p14:creationId xmlns:p14="http://schemas.microsoft.com/office/powerpoint/2010/main" val="3649083358"/>
-      </p:ext>
-    </p:extLst>
-  </p:cSld>
-  <p:clrMapOvr>
-    <a:masterClrMapping/>
-  </p:clrMapOvr>
-</p:sld>
-</file>
-
-<file path=ppt/slides/slide25.xml><?xml version="1.0" encoding="utf-8"?>
-<p:sld xmlns:a="http://schemas.openxmlformats.org/drawingml/2006/main" xmlns:r="http://schemas.openxmlformats.org/officeDocument/2006/relationships" xmlns:p="http://schemas.openxmlformats.org/presentationml/2006/main">
-  <p:cSld>
-    <p:spTree>
-      <p:nvGrpSpPr>
-        <p:cNvPr id="1" name=""/>
-        <p:cNvGrpSpPr/>
-        <p:nvPr/>
-      </p:nvGrpSpPr>
-      <p:grpSpPr>
-        <a:xfrm>
-          <a:off x="0" y="0"/>
-          <a:ext cx="0" cy="0"/>
-          <a:chOff x="0" y="0"/>
-          <a:chExt cx="0" cy="0"/>
-        </a:xfrm>
-      </p:grpSpPr>
-      <p:sp>
-        <p:nvSpPr>
-          <p:cNvPr id="2" name="Title 1"/>
-          <p:cNvSpPr>
-            <a:spLocks noGrp="1"/>
-          </p:cNvSpPr>
-          <p:nvPr>
-            <p:ph type="title"/>
-          </p:nvPr>
-        </p:nvSpPr>
-        <p:spPr/>
-        <p:txBody>
-          <a:bodyPr/>
-          <a:lstStyle/>
-          <a:p>
-            <a:r>
-              <a:rPr lang="en-US" dirty="0" err="1" smtClean="0"/>
-              <a:t>Enum</a:t>
-            </a:r>
-            <a:r>
-              <a:rPr lang="en-US" dirty="0" smtClean="0"/>
-              <a:t> support</a:t>
-            </a:r>
-            <a:endParaRPr lang="en-US" dirty="0"/>
-          </a:p>
-        </p:txBody>
-      </p:sp>
-      <p:sp>
-        <p:nvSpPr>
-          <p:cNvPr id="3" name="Content Placeholder 2"/>
-          <p:cNvSpPr>
-            <a:spLocks noGrp="1"/>
-          </p:cNvSpPr>
-          <p:nvPr>
-            <p:ph idx="1"/>
-          </p:nvPr>
-        </p:nvSpPr>
-        <p:spPr/>
-        <p:txBody>
-          <a:bodyPr/>
-          <a:lstStyle/>
-          <a:p>
-            <a:r>
-              <a:rPr lang="en-US" dirty="0" smtClean="0"/>
-              <a:t>Requires </a:t>
-            </a:r>
-            <a:r>
-              <a:rPr lang="en-US" dirty="0" err="1" smtClean="0"/>
-              <a:t>.net</a:t>
-            </a:r>
-            <a:r>
-              <a:rPr lang="en-US" dirty="0" smtClean="0"/>
-              <a:t> 4.5</a:t>
-            </a:r>
-          </a:p>
-          <a:p>
-            <a:r>
-              <a:rPr lang="en-US" dirty="0" smtClean="0"/>
-              <a:t>Change ship method property to </a:t>
-            </a:r>
-            <a:r>
-              <a:rPr lang="en-US" dirty="0" err="1" smtClean="0"/>
-              <a:t>enum</a:t>
-            </a:r>
-            <a:endParaRPr lang="en-US" dirty="0" smtClean="0"/>
-          </a:p>
-          <a:p>
-            <a:r>
-              <a:rPr lang="en-US" dirty="0" smtClean="0"/>
-              <a:t>Add new </a:t>
-            </a:r>
-            <a:r>
-              <a:rPr lang="en-US" dirty="0" err="1" smtClean="0"/>
-              <a:t>enum</a:t>
-            </a:r>
-            <a:r>
-              <a:rPr lang="en-US" dirty="0" smtClean="0"/>
-              <a:t> type</a:t>
-            </a:r>
-          </a:p>
-          <a:p>
-            <a:pPr lvl="1"/>
-            <a:r>
-              <a:rPr lang="en-US" dirty="0" smtClean="0"/>
-              <a:t>Specify </a:t>
-            </a:r>
-            <a:r>
-              <a:rPr lang="en-US" dirty="0" err="1" smtClean="0"/>
-              <a:t>enum</a:t>
-            </a:r>
-            <a:r>
-              <a:rPr lang="en-US" dirty="0" smtClean="0"/>
-              <a:t> values</a:t>
-            </a:r>
-          </a:p>
-          <a:p>
-            <a:pPr lvl="2"/>
-            <a:r>
-              <a:rPr lang="en-US" dirty="0" smtClean="0"/>
-              <a:t>Land, sea, air, …</a:t>
-            </a:r>
-          </a:p>
-          <a:p>
-            <a:r>
-              <a:rPr lang="en-US" dirty="0" smtClean="0"/>
-              <a:t>Change type of ship method to the </a:t>
-            </a:r>
-            <a:r>
-              <a:rPr lang="en-US" dirty="0" err="1" smtClean="0"/>
-              <a:t>enum</a:t>
-            </a:r>
-            <a:endParaRPr lang="en-US" dirty="0" smtClean="0"/>
-          </a:p>
-          <a:p>
-            <a:r>
-              <a:rPr lang="en-US" dirty="0" smtClean="0"/>
-              <a:t>Show how to use an existing </a:t>
-            </a:r>
-            <a:r>
-              <a:rPr lang="en-US" dirty="0" err="1" smtClean="0"/>
-              <a:t>enum</a:t>
-            </a:r>
-            <a:endParaRPr lang="en-US" dirty="0" smtClean="0"/>
-          </a:p>
-          <a:p>
-            <a:pPr lvl="1"/>
-            <a:r>
-              <a:rPr lang="en-US" dirty="0" err="1" smtClean="0"/>
-              <a:t>Enum</a:t>
-            </a:r>
-            <a:r>
-              <a:rPr lang="en-US" dirty="0" smtClean="0"/>
-              <a:t> type name must match and use reference</a:t>
-            </a:r>
-          </a:p>
-          <a:p>
-            <a:pPr lvl="1"/>
-            <a:endParaRPr lang="en-US" dirty="0"/>
-          </a:p>
-        </p:txBody>
-      </p:sp>
-    </p:spTree>
-    <p:extLst>
-      <p:ext uri="{BB962C8B-B14F-4D97-AF65-F5344CB8AC3E}">
-        <p14:creationId xmlns:p14="http://schemas.microsoft.com/office/powerpoint/2010/main" val="209619406"/>
-      </p:ext>
-    </p:extLst>
-  </p:cSld>
-  <p:clrMapOvr>
-    <a:masterClrMapping/>
-  </p:clrMapOvr>
-</p:sld>
-</file>
-
-<file path=ppt/slides/slide26.xml><?xml version="1.0" encoding="utf-8"?>
-<p:sld xmlns:a="http://schemas.openxmlformats.org/drawingml/2006/main" xmlns:r="http://schemas.openxmlformats.org/officeDocument/2006/relationships" xmlns:p="http://schemas.openxmlformats.org/presentationml/2006/main">
-  <p:cSld>
-    <p:spTree>
-      <p:nvGrpSpPr>
-        <p:cNvPr id="1" name=""/>
-        <p:cNvGrpSpPr/>
-        <p:nvPr/>
-      </p:nvGrpSpPr>
-      <p:grpSpPr>
-        <a:xfrm>
-          <a:off x="0" y="0"/>
-          <a:ext cx="0" cy="0"/>
-          <a:chOff x="0" y="0"/>
-          <a:chExt cx="0" cy="0"/>
-        </a:xfrm>
-      </p:grpSpPr>
-      <p:sp>
-        <p:nvSpPr>
-          <p:cNvPr id="2" name="Title 1"/>
-          <p:cNvSpPr>
-            <a:spLocks noGrp="1"/>
-          </p:cNvSpPr>
-          <p:nvPr>
-            <p:ph type="title"/>
-          </p:nvPr>
-        </p:nvSpPr>
-        <p:spPr/>
-        <p:txBody>
-          <a:bodyPr/>
-          <a:lstStyle/>
-          <a:p>
-            <a:r>
-              <a:rPr lang="en-US" dirty="0" smtClean="0"/>
-              <a:t>Geo modeling</a:t>
-            </a:r>
-            <a:endParaRPr lang="en-US" dirty="0"/>
-          </a:p>
-        </p:txBody>
-      </p:sp>
-      <p:sp>
-        <p:nvSpPr>
-          <p:cNvPr id="3" name="Content Placeholder 2"/>
-          <p:cNvSpPr>
-            <a:spLocks noGrp="1"/>
-          </p:cNvSpPr>
-          <p:nvPr>
-            <p:ph idx="1"/>
-          </p:nvPr>
-        </p:nvSpPr>
-        <p:spPr/>
-        <p:txBody>
-          <a:bodyPr/>
-          <a:lstStyle/>
-          <a:p>
-            <a:r>
-              <a:rPr lang="en-US" dirty="0" smtClean="0"/>
-              <a:t>Geolocation</a:t>
-            </a:r>
-          </a:p>
-          <a:p>
-            <a:r>
-              <a:rPr lang="en-US" dirty="0" smtClean="0"/>
-              <a:t>Add it to the database table</a:t>
-            </a:r>
-          </a:p>
-          <a:p>
-            <a:endParaRPr lang="en-US" dirty="0"/>
-          </a:p>
-        </p:txBody>
-      </p:sp>
-    </p:spTree>
-    <p:extLst>
-      <p:ext uri="{BB962C8B-B14F-4D97-AF65-F5344CB8AC3E}">
-        <p14:creationId xmlns:p14="http://schemas.microsoft.com/office/powerpoint/2010/main" val="1540996816"/>
-      </p:ext>
-    </p:extLst>
-  </p:cSld>
-  <p:clrMapOvr>
-    <a:masterClrMapping/>
-  </p:clrMapOvr>
-</p:sld>
-</file>
-
-<file path=ppt/slides/slide27.xml><?xml version="1.0" encoding="utf-8"?>
-<p:sld xmlns:a="http://schemas.openxmlformats.org/drawingml/2006/main" xmlns:r="http://schemas.openxmlformats.org/officeDocument/2006/relationships" xmlns:p="http://schemas.openxmlformats.org/presentationml/2006/main">
-  <p:cSld>
-    <p:spTree>
-      <p:nvGrpSpPr>
-        <p:cNvPr id="1" name=""/>
-        <p:cNvGrpSpPr/>
-        <p:nvPr/>
-      </p:nvGrpSpPr>
-      <p:grpSpPr>
-        <a:xfrm>
-          <a:off x="0" y="0"/>
-          <a:ext cx="0" cy="0"/>
-          <a:chOff x="0" y="0"/>
-          <a:chExt cx="0" cy="0"/>
-        </a:xfrm>
-      </p:grpSpPr>
-      <p:sp>
-        <p:nvSpPr>
-          <p:cNvPr id="2" name="Title 1"/>
-          <p:cNvSpPr>
-            <a:spLocks noGrp="1"/>
-          </p:cNvSpPr>
-          <p:nvPr>
-            <p:ph type="title"/>
-          </p:nvPr>
-        </p:nvSpPr>
-        <p:spPr/>
-        <p:txBody>
-          <a:bodyPr/>
-          <a:lstStyle/>
-          <a:p>
-            <a:r>
-              <a:rPr lang="en-US" dirty="0" smtClean="0"/>
-              <a:t>Keys on views</a:t>
-            </a:r>
-            <a:endParaRPr lang="en-US" dirty="0"/>
-          </a:p>
-        </p:txBody>
-      </p:sp>
-      <p:sp>
-        <p:nvSpPr>
-          <p:cNvPr id="3" name="Content Placeholder 2"/>
-          <p:cNvSpPr>
-            <a:spLocks noGrp="1"/>
-          </p:cNvSpPr>
-          <p:nvPr>
-            <p:ph idx="1"/>
-          </p:nvPr>
-        </p:nvSpPr>
-        <p:spPr/>
-        <p:txBody>
-          <a:bodyPr/>
-          <a:lstStyle/>
-          <a:p>
-            <a:r>
-              <a:rPr lang="en-US" dirty="0" smtClean="0"/>
-              <a:t>No primary and no non-</a:t>
-            </a:r>
-            <a:r>
-              <a:rPr lang="en-US" dirty="0" err="1" smtClean="0"/>
-              <a:t>nullable</a:t>
-            </a:r>
-            <a:r>
-              <a:rPr lang="en-US" dirty="0" smtClean="0"/>
-              <a:t>, then not imported</a:t>
-            </a:r>
-          </a:p>
-          <a:p>
-            <a:endParaRPr lang="en-US" dirty="0"/>
-          </a:p>
-        </p:txBody>
-      </p:sp>
-    </p:spTree>
-    <p:extLst>
-      <p:ext uri="{BB962C8B-B14F-4D97-AF65-F5344CB8AC3E}">
-        <p14:creationId xmlns:p14="http://schemas.microsoft.com/office/powerpoint/2010/main" val="1213220085"/>
-      </p:ext>
-    </p:extLst>
-  </p:cSld>
-  <p:clrMapOvr>
-    <a:masterClrMapping/>
-  </p:clrMapOvr>
-</p:sld>
-</file>
-
-<file path=ppt/slides/slide28.xml><?xml version="1.0" encoding="utf-8"?>
-<p:sld xmlns:a="http://schemas.openxmlformats.org/drawingml/2006/main" xmlns:r="http://schemas.openxmlformats.org/officeDocument/2006/relationships" xmlns:p="http://schemas.openxmlformats.org/presentationml/2006/main">
-  <p:cSld>
-    <p:spTree>
-      <p:nvGrpSpPr>
-        <p:cNvPr id="1" name=""/>
-        <p:cNvGrpSpPr/>
-        <p:nvPr/>
-      </p:nvGrpSpPr>
-      <p:grpSpPr>
-        <a:xfrm>
-          <a:off x="0" y="0"/>
-          <a:ext cx="0" cy="0"/>
-          <a:chOff x="0" y="0"/>
-          <a:chExt cx="0" cy="0"/>
-        </a:xfrm>
-      </p:grpSpPr>
-      <p:sp>
-        <p:nvSpPr>
-          <p:cNvPr id="2" name="Title 1"/>
-          <p:cNvSpPr>
-            <a:spLocks noGrp="1"/>
-          </p:cNvSpPr>
-          <p:nvPr>
-            <p:ph type="title"/>
-          </p:nvPr>
-        </p:nvSpPr>
-        <p:spPr/>
-        <p:txBody>
-          <a:bodyPr/>
-          <a:lstStyle/>
-          <a:p>
-            <a:r>
-              <a:rPr lang="en-US" smtClean="0"/>
-              <a:t>Summary</a:t>
-            </a:r>
-            <a:endParaRPr lang="en-US"/>
-          </a:p>
-        </p:txBody>
-      </p:sp>
-      <p:sp>
-        <p:nvSpPr>
-          <p:cNvPr id="3" name="Content Placeholder 2"/>
-          <p:cNvSpPr>
-            <a:spLocks noGrp="1"/>
-          </p:cNvSpPr>
-          <p:nvPr>
-            <p:ph idx="1"/>
-          </p:nvPr>
-        </p:nvSpPr>
-        <p:spPr/>
-        <p:txBody>
-          <a:bodyPr/>
-          <a:lstStyle/>
-          <a:p>
-            <a:endParaRPr lang="en-US"/>
-          </a:p>
-        </p:txBody>
-      </p:sp>
-    </p:spTree>
-    <p:extLst>
-      <p:ext uri="{BB962C8B-B14F-4D97-AF65-F5344CB8AC3E}">
-        <p14:creationId xmlns:p14="http://schemas.microsoft.com/office/powerpoint/2010/main" val="4082111346"/>
-      </p:ext>
-    </p:extLst>
-  </p:cSld>
-  <p:clrMapOvr>
-    <a:masterClrMapping/>
-  </p:clrMapOvr>
-</p:sld>
-</file>
-
-<file path=ppt/slides/slide29.xml><?xml version="1.0" encoding="utf-8"?>
-<p:sld xmlns:a="http://schemas.openxmlformats.org/drawingml/2006/main" xmlns:r="http://schemas.openxmlformats.org/officeDocument/2006/relationships" xmlns:p="http://schemas.openxmlformats.org/presentationml/2006/main">
-  <p:cSld>
-    <p:spTree>
-      <p:nvGrpSpPr>
-        <p:cNvPr id="1" name=""/>
-        <p:cNvGrpSpPr/>
-        <p:nvPr/>
-      </p:nvGrpSpPr>
-      <p:grpSpPr>
-        <a:xfrm>
-          <a:off x="0" y="0"/>
-          <a:ext cx="0" cy="0"/>
-          <a:chOff x="0" y="0"/>
-          <a:chExt cx="0" cy="0"/>
-        </a:xfrm>
-      </p:grpSpPr>
-      <p:sp>
-        <p:nvSpPr>
-          <p:cNvPr id="2" name="Title 1"/>
-          <p:cNvSpPr>
-            <a:spLocks noGrp="1"/>
-          </p:cNvSpPr>
-          <p:nvPr>
-            <p:ph type="title"/>
-          </p:nvPr>
-        </p:nvSpPr>
-        <p:spPr/>
-        <p:txBody>
-          <a:bodyPr/>
-          <a:lstStyle/>
-          <a:p>
-            <a:r>
-              <a:rPr lang="en-US" dirty="0" smtClean="0"/>
-              <a:t>Demo</a:t>
-            </a:r>
-            <a:endParaRPr lang="en-US" dirty="0"/>
-          </a:p>
-        </p:txBody>
-      </p:sp>
-      <p:sp>
-        <p:nvSpPr>
-          <p:cNvPr id="3" name="Content Placeholder 2"/>
-          <p:cNvSpPr>
-            <a:spLocks noGrp="1"/>
-          </p:cNvSpPr>
-          <p:nvPr>
-            <p:ph idx="1"/>
-          </p:nvPr>
-        </p:nvSpPr>
-        <p:spPr/>
-        <p:txBody>
-          <a:bodyPr/>
-          <a:lstStyle/>
-          <a:p>
-            <a:endParaRPr lang="en-US"/>
-          </a:p>
-        </p:txBody>
-      </p:sp>
-    </p:spTree>
-    <p:extLst>
-      <p:ext uri="{BB962C8B-B14F-4D97-AF65-F5344CB8AC3E}">
-        <p14:creationId xmlns:p14="http://schemas.microsoft.com/office/powerpoint/2010/main" val="1874241560"/>
+        <p14:creationId xmlns:p14="http://schemas.microsoft.com/office/powerpoint/2010/main" val="3177168828"/>
       </p:ext>
     </p:extLst>
   </p:cSld>
@@ -5231,7 +3491,11 @@
           <a:p>
             <a:r>
               <a:rPr lang="en-US" dirty="0" smtClean="0"/>
-              <a:t>What and Why Database First?</a:t>
+              <a:t>Demo: Import </a:t>
+            </a:r>
+            <a:r>
+              <a:rPr lang="en-US" dirty="0" err="1" smtClean="0"/>
+              <a:t>BreakAway</a:t>
             </a:r>
             <a:endParaRPr lang="en-US" dirty="0"/>
           </a:p>
@@ -5247,64 +3511,70 @@
             <p:ph idx="1"/>
           </p:nvPr>
         </p:nvSpPr>
-        <p:spPr/>
-        <p:txBody>
-          <a:bodyPr/>
-          <a:lstStyle/>
-          <a:p>
-            <a:r>
-              <a:rPr lang="en-US" dirty="0" smtClean="0"/>
-              <a:t>The database already exists</a:t>
-            </a:r>
-          </a:p>
-          <a:p>
-            <a:r>
-              <a:rPr lang="en-US" dirty="0" smtClean="0"/>
-              <a:t>You want low level control of the database</a:t>
-            </a:r>
-          </a:p>
-          <a:p>
-            <a:r>
-              <a:rPr lang="en-US" dirty="0" smtClean="0"/>
-              <a:t>DB is managed by DBA’s</a:t>
-            </a:r>
-          </a:p>
-          <a:p>
+        <p:spPr>
+          <a:xfrm>
+            <a:off x="628650" y="1825625"/>
+            <a:ext cx="4029075" cy="4351338"/>
+          </a:xfrm>
+        </p:spPr>
+        <p:txBody>
+          <a:bodyPr/>
+          <a:lstStyle/>
+          <a:p>
+            <a:r>
+              <a:rPr lang="en-US" dirty="0" smtClean="0"/>
+              <a:t>New class library project</a:t>
+            </a:r>
+          </a:p>
+          <a:p>
+            <a:r>
+              <a:rPr lang="en-US" dirty="0" smtClean="0"/>
+              <a:t>Create data connection</a:t>
+            </a:r>
+          </a:p>
+          <a:p>
+            <a:r>
+              <a:rPr lang="en-US" dirty="0" smtClean="0"/>
+              <a:t>Add ADO.NET Entity Model from the database</a:t>
+            </a:r>
+          </a:p>
+          <a:p>
+            <a:r>
+              <a:rPr lang="en-US" dirty="0" smtClean="0"/>
+              <a:t>Explore the model</a:t>
+            </a:r>
             <a:endParaRPr lang="en-US" dirty="0"/>
           </a:p>
-          <a:p>
-            <a:r>
-              <a:rPr lang="en-US" dirty="0" smtClean="0"/>
-              <a:t>Model changes are made in the database</a:t>
-            </a:r>
-          </a:p>
-          <a:p>
-            <a:pPr lvl="1"/>
-            <a:r>
-              <a:rPr lang="en-US" dirty="0" smtClean="0"/>
-              <a:t>Updated in the designer</a:t>
-            </a:r>
-          </a:p>
-          <a:p>
-            <a:r>
-              <a:rPr lang="en-US" dirty="0" smtClean="0"/>
-              <a:t>Entire database can be generated from the model</a:t>
-            </a:r>
-          </a:p>
-          <a:p>
-            <a:pPr lvl="1"/>
-            <a:r>
-              <a:rPr lang="en-US" dirty="0" smtClean="0"/>
-              <a:t>Updates require a drop</a:t>
-            </a:r>
-            <a:endParaRPr lang="en-US" dirty="0"/>
-          </a:p>
-        </p:txBody>
-      </p:sp>
+        </p:txBody>
+      </p:sp>
+      <p:pic>
+        <p:nvPicPr>
+          <p:cNvPr id="7" name="Picture 6"/>
+          <p:cNvPicPr>
+            <a:picLocks noChangeAspect="1"/>
+          </p:cNvPicPr>
+          <p:nvPr/>
+        </p:nvPicPr>
+        <p:blipFill>
+          <a:blip r:embed="rId2"/>
+          <a:stretch>
+            <a:fillRect/>
+          </a:stretch>
+        </p:blipFill>
+        <p:spPr>
+          <a:xfrm>
+            <a:off x="5815012" y="1909762"/>
+            <a:ext cx="2976563" cy="4628229"/>
+          </a:xfrm>
+          <a:prstGeom prst="rect">
+            <a:avLst/>
+          </a:prstGeom>
+        </p:spPr>
+      </p:pic>
     </p:spTree>
     <p:extLst>
       <p:ext uri="{BB962C8B-B14F-4D97-AF65-F5344CB8AC3E}">
-        <p14:creationId xmlns:p14="http://schemas.microsoft.com/office/powerpoint/2010/main" val="3177168828"/>
+        <p14:creationId xmlns:p14="http://schemas.microsoft.com/office/powerpoint/2010/main" val="3295577896"/>
       </p:ext>
     </p:extLst>
   </p:cSld>
@@ -5348,7 +3618,7 @@
           <a:p>
             <a:r>
               <a:rPr lang="en-US" dirty="0" smtClean="0"/>
-              <a:t>Database first</a:t>
+              <a:t>Explore the Model</a:t>
             </a:r>
             <a:endParaRPr lang="en-US" dirty="0"/>
           </a:p>
@@ -5366,99 +3636,39 @@
         </p:nvSpPr>
         <p:spPr/>
         <p:txBody>
-          <a:bodyPr>
-            <a:normAutofit fontScale="77500" lnSpcReduction="20000"/>
-          </a:bodyPr>
-          <a:lstStyle/>
-          <a:p>
-            <a:r>
-              <a:rPr lang="en-US" dirty="0" smtClean="0"/>
-              <a:t>Install AW database</a:t>
-            </a:r>
-          </a:p>
-          <a:p>
-            <a:r>
-              <a:rPr lang="en-US" dirty="0" smtClean="0"/>
-              <a:t>Create class project</a:t>
-            </a:r>
-          </a:p>
-          <a:p>
-            <a:r>
-              <a:rPr lang="en-US" dirty="0" smtClean="0"/>
-              <a:t>Add ADO.NET Entity Model</a:t>
-            </a:r>
-          </a:p>
-          <a:p>
-            <a:r>
-              <a:rPr lang="en-US" dirty="0" smtClean="0"/>
-              <a:t>Point to AW database</a:t>
-            </a:r>
-          </a:p>
-          <a:p>
-            <a:r>
-              <a:rPr lang="en-US" dirty="0" smtClean="0"/>
-              <a:t>Create model</a:t>
-            </a:r>
-          </a:p>
-          <a:p>
-            <a:r>
-              <a:rPr lang="en-US" dirty="0" smtClean="0"/>
-              <a:t>Show the model</a:t>
-            </a:r>
-          </a:p>
-          <a:p>
-            <a:r>
-              <a:rPr lang="en-US" dirty="0" smtClean="0"/>
-              <a:t>Coloring</a:t>
-            </a:r>
-          </a:p>
-          <a:p>
-            <a:r>
-              <a:rPr lang="en-US" dirty="0" smtClean="0"/>
-              <a:t>Diagram partitioning</a:t>
-            </a:r>
-          </a:p>
-          <a:p>
-            <a:r>
-              <a:rPr lang="en-US" dirty="0" smtClean="0"/>
-              <a:t>Files, </a:t>
-            </a:r>
+          <a:bodyPr/>
+          <a:lstStyle/>
+          <a:p>
+            <a:r>
+              <a:rPr lang="en-US" dirty="0" smtClean="0"/>
+              <a:t>Entities and Relationships</a:t>
+            </a:r>
+          </a:p>
+          <a:p>
             <a:r>
               <a:rPr lang="en-US" dirty="0" err="1" smtClean="0"/>
-              <a:t>edmx</a:t>
-            </a:r>
-            <a:r>
-              <a:rPr lang="en-US" dirty="0" smtClean="0"/>
-              <a:t>, .</a:t>
-            </a:r>
-            <a:r>
-              <a:rPr lang="en-US" dirty="0" err="1" smtClean="0"/>
-              <a:t>tt</a:t>
+              <a:t>App.config</a:t>
             </a:r>
             <a:endParaRPr lang="en-US" dirty="0" smtClean="0"/>
           </a:p>
           <a:p>
             <a:r>
               <a:rPr lang="en-US" dirty="0" smtClean="0"/>
-              <a:t>POCO</a:t>
-            </a:r>
-          </a:p>
-          <a:p>
-            <a:r>
-              <a:rPr lang="en-US" dirty="0" smtClean="0"/>
-              <a:t>Creation of navigation properties</a:t>
-            </a:r>
-          </a:p>
-          <a:p>
-            <a:r>
-              <a:rPr lang="en-US" dirty="0" smtClean="0"/>
-              <a:t>Rename function imports</a:t>
-            </a:r>
-          </a:p>
-          <a:p>
-            <a:endParaRPr lang="en-US" dirty="0" smtClean="0"/>
-          </a:p>
-          <a:p>
+              <a:t>Generated </a:t>
+            </a:r>
+            <a:r>
+              <a:rPr lang="en-US" dirty="0" smtClean="0"/>
+              <a:t>code</a:t>
+            </a:r>
+          </a:p>
+          <a:p>
+            <a:endParaRPr lang="en-US" dirty="0"/>
+          </a:p>
+          <a:p>
+            <a:r>
+              <a:rPr lang="en-US" dirty="0" smtClean="0"/>
+              <a:t>Mappings are built from the code</a:t>
+            </a:r>
             <a:endParaRPr lang="en-US" dirty="0"/>
           </a:p>
         </p:txBody>
@@ -5466,7 +3676,7 @@
     </p:spTree>
     <p:extLst>
       <p:ext uri="{BB962C8B-B14F-4D97-AF65-F5344CB8AC3E}">
-        <p14:creationId xmlns:p14="http://schemas.microsoft.com/office/powerpoint/2010/main" val="1104104004"/>
+        <p14:creationId xmlns:p14="http://schemas.microsoft.com/office/powerpoint/2010/main" val="2506903841"/>
       </p:ext>
     </p:extLst>
   </p:cSld>
@@ -5503,16 +3713,19 @@
             <p:ph type="title"/>
           </p:nvPr>
         </p:nvSpPr>
-        <p:spPr>
-          <a:xfrm>
-            <a:off x="628650" y="394309"/>
-            <a:ext cx="7886700" cy="1325563"/>
-          </a:xfrm>
-        </p:spPr>
-        <p:txBody>
-          <a:bodyPr/>
-          <a:lstStyle/>
-          <a:p>
+        <p:spPr/>
+        <p:txBody>
+          <a:bodyPr/>
+          <a:lstStyle/>
+          <a:p>
+            <a:r>
+              <a:rPr lang="en-US" dirty="0" smtClean="0"/>
+              <a:t>Auto-generated </a:t>
+            </a:r>
+            <a:r>
+              <a:rPr lang="en-US" dirty="0" err="1" smtClean="0"/>
+              <a:t>COntent</a:t>
+            </a:r>
             <a:endParaRPr lang="en-US" dirty="0"/>
           </a:p>
         </p:txBody>
@@ -5534,34 +3747,71 @@
           <a:p>
             <a:r>
               <a:rPr lang="en-US" dirty="0" smtClean="0"/>
-              <a:t>Conceptual model</a:t>
-            </a:r>
-          </a:p>
-          <a:p>
-            <a:r>
-              <a:rPr lang="en-US" dirty="0" smtClean="0"/>
-              <a:t>Model metadata</a:t>
-            </a:r>
-          </a:p>
-          <a:p>
-            <a:r>
-              <a:rPr lang="en-US" dirty="0" smtClean="0"/>
-              <a:t>Table mapping command in designer</a:t>
-            </a:r>
-          </a:p>
-          <a:p>
-            <a:r>
-              <a:rPr lang="en-US" dirty="0" smtClean="0"/>
-              <a:t>Change property in model and show in table map</a:t>
-            </a:r>
-          </a:p>
-          <a:p>
-            <a:r>
-              <a:rPr lang="en-US" dirty="0" smtClean="0"/>
-              <a:t>Designer based entity modeling course</a:t>
-            </a:r>
-          </a:p>
-          <a:p>
+              <a:t>*.</a:t>
+            </a:r>
+            <a:r>
+              <a:rPr lang="en-US" dirty="0" err="1" smtClean="0"/>
+              <a:t>edmx</a:t>
+            </a:r>
+            <a:r>
+              <a:rPr lang="en-US" dirty="0" smtClean="0"/>
+              <a:t> file</a:t>
+            </a:r>
+          </a:p>
+          <a:p>
+            <a:r>
+              <a:rPr lang="en-US" dirty="0" smtClean="0"/>
+              <a:t>*.</a:t>
+            </a:r>
+            <a:r>
+              <a:rPr lang="en-US" dirty="0" err="1" smtClean="0"/>
+              <a:t>tt</a:t>
+            </a:r>
+            <a:r>
+              <a:rPr lang="en-US" dirty="0" smtClean="0"/>
+              <a:t> files</a:t>
+            </a:r>
+          </a:p>
+          <a:p>
+            <a:pPr lvl="1"/>
+            <a:r>
+              <a:rPr lang="en-US" dirty="0" smtClean="0"/>
+              <a:t>Model.context.tt</a:t>
+            </a:r>
+          </a:p>
+          <a:p>
+            <a:pPr lvl="1"/>
+            <a:r>
+              <a:rPr lang="en-US" dirty="0" smtClean="0"/>
+              <a:t>Model.tt</a:t>
+            </a:r>
+          </a:p>
+          <a:p>
+            <a:r>
+              <a:rPr lang="en-US" dirty="0" smtClean="0"/>
+              <a:t>Context object in </a:t>
+            </a:r>
+            <a:r>
+              <a:rPr lang="en-US" dirty="0" err="1" smtClean="0"/>
+              <a:t>Model.Context.cs</a:t>
+            </a:r>
+            <a:r>
+              <a:rPr lang="en-US" dirty="0" smtClean="0"/>
+              <a:t> (generated)</a:t>
+            </a:r>
+          </a:p>
+          <a:p>
+            <a:r>
+              <a:rPr lang="en-US" dirty="0" err="1" smtClean="0"/>
+              <a:t>Model.edmx.diagram</a:t>
+            </a:r>
+            <a:endParaRPr lang="en-US" dirty="0" smtClean="0"/>
+          </a:p>
+          <a:p>
+            <a:r>
+              <a:rPr lang="en-US" smtClean="0"/>
+              <a:t>Model.edmx.diagram</a:t>
+            </a:r>
             <a:endParaRPr lang="en-US" dirty="0"/>
           </a:p>
         </p:txBody>
@@ -5569,7 +3819,7 @@
     </p:spTree>
     <p:extLst>
       <p:ext uri="{BB962C8B-B14F-4D97-AF65-F5344CB8AC3E}">
-        <p14:creationId xmlns:p14="http://schemas.microsoft.com/office/powerpoint/2010/main" val="2961908449"/>
+        <p14:creationId xmlns:p14="http://schemas.microsoft.com/office/powerpoint/2010/main" val="4030993022"/>
       </p:ext>
     </p:extLst>
   </p:cSld>
@@ -5613,11 +3863,7 @@
           <a:p>
             <a:r>
               <a:rPr lang="en-US" dirty="0" smtClean="0"/>
-              <a:t>1 – </a:t>
-            </a:r>
-            <a:r>
-              <a:rPr lang="en-US" dirty="0" err="1" smtClean="0"/>
-              <a:t>ImportAW</a:t>
+              <a:t>Entities Consist of:</a:t>
             </a:r>
             <a:endParaRPr lang="en-US" dirty="0"/>
           </a:p>
@@ -5638,14 +3884,48 @@
           <a:bodyPr/>
           <a:lstStyle/>
           <a:p>
-            <a:endParaRPr lang="en-US"/>
-          </a:p>
-        </p:txBody>
-      </p:sp>
+            <a:r>
+              <a:rPr lang="en-US" dirty="0" smtClean="0"/>
+              <a:t>Data Properties</a:t>
+            </a:r>
+          </a:p>
+          <a:p>
+            <a:r>
+              <a:rPr lang="en-US" dirty="0" smtClean="0"/>
+              <a:t>Navigation Properties</a:t>
+            </a:r>
+            <a:endParaRPr lang="en-US" dirty="0"/>
+          </a:p>
+        </p:txBody>
+      </p:sp>
+      <p:pic>
+        <p:nvPicPr>
+          <p:cNvPr id="5" name="Picture 4"/>
+          <p:cNvPicPr>
+            <a:picLocks noChangeAspect="1"/>
+          </p:cNvPicPr>
+          <p:nvPr/>
+        </p:nvPicPr>
+        <p:blipFill>
+          <a:blip r:embed="rId2"/>
+          <a:stretch>
+            <a:fillRect/>
+          </a:stretch>
+        </p:blipFill>
+        <p:spPr>
+          <a:xfrm>
+            <a:off x="4862512" y="1543050"/>
+            <a:ext cx="4143375" cy="5124450"/>
+          </a:xfrm>
+          <a:prstGeom prst="rect">
+            <a:avLst/>
+          </a:prstGeom>
+        </p:spPr>
+      </p:pic>
     </p:spTree>
     <p:extLst>
       <p:ext uri="{BB962C8B-B14F-4D97-AF65-F5344CB8AC3E}">
-        <p14:creationId xmlns:p14="http://schemas.microsoft.com/office/powerpoint/2010/main" val="3295577896"/>
+        <p14:creationId xmlns:p14="http://schemas.microsoft.com/office/powerpoint/2010/main" val="3330954134"/>
       </p:ext>
     </p:extLst>
   </p:cSld>
@@ -5689,7 +3969,51 @@
           <a:p>
             <a:r>
               <a:rPr lang="en-US" dirty="0" smtClean="0"/>
-              <a:t>Create Solution and Class Library</a:t>
+              <a:t>Entities</a:t>
+            </a:r>
+            <a:endParaRPr lang="en-US" dirty="0"/>
+          </a:p>
+        </p:txBody>
+      </p:sp>
+      <p:sp>
+        <p:nvSpPr>
+          <p:cNvPr id="3" name="Content Placeholder 2"/>
+          <p:cNvSpPr>
+            <a:spLocks noGrp="1"/>
+          </p:cNvSpPr>
+          <p:nvPr>
+            <p:ph idx="1"/>
+          </p:nvPr>
+        </p:nvSpPr>
+        <p:spPr>
+          <a:xfrm>
+            <a:off x="628650" y="1825625"/>
+            <a:ext cx="2962275" cy="4351338"/>
+          </a:xfrm>
+        </p:spPr>
+        <p:txBody>
+          <a:bodyPr/>
+          <a:lstStyle/>
+          <a:p>
+            <a:r>
+              <a:rPr lang="en-US" dirty="0" smtClean="0"/>
+              <a:t>Example: Person</a:t>
+            </a:r>
+          </a:p>
+          <a:p>
+            <a:r>
+              <a:rPr lang="en-US" dirty="0" smtClean="0"/>
+              <a:t>POCO</a:t>
+            </a:r>
+          </a:p>
+          <a:p>
+            <a:r>
+              <a:rPr lang="en-US" dirty="0" err="1" smtClean="0"/>
+              <a:t>HashSets</a:t>
+            </a:r>
+            <a:r>
+              <a:rPr lang="en-US" dirty="0" smtClean="0"/>
+              <a:t> for relationships</a:t>
             </a:r>
             <a:endParaRPr lang="en-US" dirty="0"/>
           </a:p>
@@ -5711,32 +4035,8 @@
         </p:blipFill>
         <p:spPr>
           <a:xfrm>
-            <a:off x="397352" y="1488332"/>
-            <a:ext cx="5883613" cy="4066162"/>
-          </a:xfrm>
-          <a:prstGeom prst="rect">
-            <a:avLst/>
-          </a:prstGeom>
-        </p:spPr>
-      </p:pic>
-      <p:pic>
-        <p:nvPicPr>
-          <p:cNvPr id="5" name="Picture 4"/>
-          <p:cNvPicPr>
-            <a:picLocks noChangeAspect="1"/>
-          </p:cNvPicPr>
-          <p:nvPr/>
-        </p:nvPicPr>
-        <p:blipFill>
-          <a:blip r:embed="rId3"/>
-          <a:stretch>
-            <a:fillRect/>
-          </a:stretch>
-        </p:blipFill>
-        <p:spPr>
-          <a:xfrm>
-            <a:off x="6379069" y="1488332"/>
-            <a:ext cx="2607895" cy="4845692"/>
+            <a:off x="5343952" y="1499393"/>
+            <a:ext cx="3380947" cy="5003801"/>
           </a:xfrm>
           <a:prstGeom prst="rect">
             <a:avLst/>
@@ -5746,7 +4046,7 @@
     </p:spTree>
     <p:extLst>
       <p:ext uri="{BB962C8B-B14F-4D97-AF65-F5344CB8AC3E}">
-        <p14:creationId xmlns:p14="http://schemas.microsoft.com/office/powerpoint/2010/main" val="2713868756"/>
+        <p14:creationId xmlns:p14="http://schemas.microsoft.com/office/powerpoint/2010/main" val="3496473471"/>
       </p:ext>
     </p:extLst>
   </p:cSld>
@@ -5789,8 +4089,50 @@
           <a:lstStyle/>
           <a:p>
             <a:r>
-              <a:rPr lang="en-US" dirty="0" smtClean="0"/>
-              <a:t>Add a Data Connection</a:t>
+              <a:rPr lang="en-US" dirty="0" err="1" smtClean="0"/>
+              <a:t>DbContext</a:t>
+            </a:r>
+            <a:endParaRPr lang="en-US" dirty="0"/>
+          </a:p>
+        </p:txBody>
+      </p:sp>
+      <p:sp>
+        <p:nvSpPr>
+          <p:cNvPr id="3" name="Content Placeholder 2"/>
+          <p:cNvSpPr>
+            <a:spLocks noGrp="1"/>
+          </p:cNvSpPr>
+          <p:nvPr>
+            <p:ph idx="1"/>
+          </p:nvPr>
+        </p:nvSpPr>
+        <p:spPr>
+          <a:xfrm>
+            <a:off x="628650" y="1825625"/>
+            <a:ext cx="3638550" cy="4351338"/>
+          </a:xfrm>
+        </p:spPr>
+        <p:txBody>
+          <a:bodyPr/>
+          <a:lstStyle/>
+          <a:p>
+            <a:r>
+              <a:rPr lang="en-US" dirty="0" smtClean="0"/>
+              <a:t>The repository pattern for managing entities from the database</a:t>
+            </a:r>
+          </a:p>
+          <a:p>
+            <a:r>
+              <a:rPr lang="en-US" dirty="0" smtClean="0"/>
+              <a:t>Each Table is a </a:t>
+            </a:r>
+            <a:r>
+              <a:rPr lang="en-US" dirty="0" err="1" smtClean="0"/>
+              <a:t>DbSet</a:t>
+            </a:r>
+            <a:r>
+              <a:rPr lang="en-US" dirty="0" smtClean="0"/>
+              <a:t> object</a:t>
             </a:r>
             <a:endParaRPr lang="en-US" dirty="0"/>
           </a:p>
@@ -5812,32 +4154,8 @@
         </p:blipFill>
         <p:spPr>
           <a:xfrm>
-            <a:off x="857961" y="1690689"/>
-            <a:ext cx="3122770" cy="4569907"/>
-          </a:xfrm>
-          <a:prstGeom prst="rect">
-            <a:avLst/>
-          </a:prstGeom>
-        </p:spPr>
-      </p:pic>
-      <p:pic>
-        <p:nvPicPr>
-          <p:cNvPr id="6" name="Picture 5"/>
-          <p:cNvPicPr>
-            <a:picLocks noChangeAspect="1"/>
-          </p:cNvPicPr>
-          <p:nvPr/>
-        </p:nvPicPr>
-        <p:blipFill>
-          <a:blip r:embed="rId3"/>
-          <a:stretch>
-            <a:fillRect/>
-          </a:stretch>
-        </p:blipFill>
-        <p:spPr>
-          <a:xfrm>
-            <a:off x="4588619" y="1761621"/>
-            <a:ext cx="3390900" cy="723900"/>
+            <a:off x="4474746" y="1943099"/>
+            <a:ext cx="4588291" cy="4033839"/>
           </a:xfrm>
           <a:prstGeom prst="rect">
             <a:avLst/>
@@ -5847,7 +4165,7 @@
     </p:spTree>
     <p:extLst>
       <p:ext uri="{BB962C8B-B14F-4D97-AF65-F5344CB8AC3E}">
-        <p14:creationId xmlns:p14="http://schemas.microsoft.com/office/powerpoint/2010/main" val="3614447371"/>
+        <p14:creationId xmlns:p14="http://schemas.microsoft.com/office/powerpoint/2010/main" val="3304952894"/>
       </p:ext>
     </p:extLst>
   </p:cSld>
@@ -5891,7 +4209,7 @@
           <a:p>
             <a:r>
               <a:rPr lang="en-US" dirty="0" smtClean="0"/>
-              <a:t>Add and ADO.NET Entity DM Item</a:t>
+              <a:t>Table mappings</a:t>
             </a:r>
             <a:endParaRPr lang="en-US" dirty="0"/>
           </a:p>
@@ -5899,7 +4217,7 @@
       </p:sp>
       <p:pic>
         <p:nvPicPr>
-          <p:cNvPr id="5" name="Picture 4"/>
+          <p:cNvPr id="3" name="Picture 2"/>
           <p:cNvPicPr>
             <a:picLocks noChangeAspect="1"/>
           </p:cNvPicPr>
@@ -5913,8 +4231,8 @@
         </p:blipFill>
         <p:spPr>
           <a:xfrm>
-            <a:off x="525141" y="1882473"/>
-            <a:ext cx="8093717" cy="4638504"/>
+            <a:off x="885825" y="1690689"/>
+            <a:ext cx="7372350" cy="4181475"/>
           </a:xfrm>
           <a:prstGeom prst="rect">
             <a:avLst/>
@@ -5924,7 +4242,7 @@
     </p:spTree>
     <p:extLst>
       <p:ext uri="{BB962C8B-B14F-4D97-AF65-F5344CB8AC3E}">
-        <p14:creationId xmlns:p14="http://schemas.microsoft.com/office/powerpoint/2010/main" val="2408584929"/>
+        <p14:creationId xmlns:p14="http://schemas.microsoft.com/office/powerpoint/2010/main" val="774898647"/>
       </p:ext>
     </p:extLst>
   </p:cSld>

</xml_diff>

<commit_message>
Revisions to slide as well as demos
</commit_message>
<xml_diff>
--- a/Slides/EF/2 - Database First.pptx
+++ b/Slides/EF/2 - Database First.pptx
@@ -8,15 +8,16 @@
     <p:sldId id="286" r:id="rId2"/>
     <p:sldId id="282" r:id="rId3"/>
     <p:sldId id="268" r:id="rId4"/>
-    <p:sldId id="278" r:id="rId5"/>
-    <p:sldId id="283" r:id="rId6"/>
-    <p:sldId id="281" r:id="rId7"/>
-    <p:sldId id="288" r:id="rId8"/>
-    <p:sldId id="287" r:id="rId9"/>
-    <p:sldId id="284" r:id="rId10"/>
-    <p:sldId id="262" r:id="rId11"/>
-    <p:sldId id="258" r:id="rId12"/>
-    <p:sldId id="257" r:id="rId13"/>
+    <p:sldId id="289" r:id="rId5"/>
+    <p:sldId id="278" r:id="rId6"/>
+    <p:sldId id="283" r:id="rId7"/>
+    <p:sldId id="281" r:id="rId8"/>
+    <p:sldId id="288" r:id="rId9"/>
+    <p:sldId id="287" r:id="rId10"/>
+    <p:sldId id="284" r:id="rId11"/>
+    <p:sldId id="262" r:id="rId12"/>
+    <p:sldId id="258" r:id="rId13"/>
+    <p:sldId id="257" r:id="rId14"/>
   </p:sldIdLst>
   <p:sldSz cx="9144000" cy="6858000" type="screen4x3"/>
   <p:notesSz cx="6858000" cy="9144000"/>
@@ -254,7 +255,7 @@
           <a:p>
             <a:fld id="{51647FD5-68CD-4470-B86E-1BC2872C8822}" type="datetimeFigureOut">
               <a:rPr lang="en-US" smtClean="0"/>
-              <a:t>2/1/2015</a:t>
+              <a:t>2/3/2015</a:t>
             </a:fld>
             <a:endParaRPr lang="en-US"/>
           </a:p>
@@ -424,7 +425,7 @@
           <a:p>
             <a:fld id="{51647FD5-68CD-4470-B86E-1BC2872C8822}" type="datetimeFigureOut">
               <a:rPr lang="en-US" smtClean="0"/>
-              <a:t>2/1/2015</a:t>
+              <a:t>2/3/2015</a:t>
             </a:fld>
             <a:endParaRPr lang="en-US"/>
           </a:p>
@@ -604,7 +605,7 @@
           <a:p>
             <a:fld id="{51647FD5-68CD-4470-B86E-1BC2872C8822}" type="datetimeFigureOut">
               <a:rPr lang="en-US" smtClean="0"/>
-              <a:t>2/1/2015</a:t>
+              <a:t>2/3/2015</a:t>
             </a:fld>
             <a:endParaRPr lang="en-US"/>
           </a:p>
@@ -774,7 +775,7 @@
           <a:p>
             <a:fld id="{51647FD5-68CD-4470-B86E-1BC2872C8822}" type="datetimeFigureOut">
               <a:rPr lang="en-US" smtClean="0"/>
-              <a:t>2/1/2015</a:t>
+              <a:t>2/3/2015</a:t>
             </a:fld>
             <a:endParaRPr lang="en-US"/>
           </a:p>
@@ -1018,7 +1019,7 @@
           <a:p>
             <a:fld id="{51647FD5-68CD-4470-B86E-1BC2872C8822}" type="datetimeFigureOut">
               <a:rPr lang="en-US" smtClean="0"/>
-              <a:t>2/1/2015</a:t>
+              <a:t>2/3/2015</a:t>
             </a:fld>
             <a:endParaRPr lang="en-US"/>
           </a:p>
@@ -1250,7 +1251,7 @@
           <a:p>
             <a:fld id="{51647FD5-68CD-4470-B86E-1BC2872C8822}" type="datetimeFigureOut">
               <a:rPr lang="en-US" smtClean="0"/>
-              <a:t>2/1/2015</a:t>
+              <a:t>2/3/2015</a:t>
             </a:fld>
             <a:endParaRPr lang="en-US"/>
           </a:p>
@@ -1617,7 +1618,7 @@
           <a:p>
             <a:fld id="{51647FD5-68CD-4470-B86E-1BC2872C8822}" type="datetimeFigureOut">
               <a:rPr lang="en-US" smtClean="0"/>
-              <a:t>2/1/2015</a:t>
+              <a:t>2/3/2015</a:t>
             </a:fld>
             <a:endParaRPr lang="en-US"/>
           </a:p>
@@ -1735,7 +1736,7 @@
           <a:p>
             <a:fld id="{51647FD5-68CD-4470-B86E-1BC2872C8822}" type="datetimeFigureOut">
               <a:rPr lang="en-US" smtClean="0"/>
-              <a:t>2/1/2015</a:t>
+              <a:t>2/3/2015</a:t>
             </a:fld>
             <a:endParaRPr lang="en-US"/>
           </a:p>
@@ -1830,7 +1831,7 @@
           <a:p>
             <a:fld id="{51647FD5-68CD-4470-B86E-1BC2872C8822}" type="datetimeFigureOut">
               <a:rPr lang="en-US" smtClean="0"/>
-              <a:t>2/1/2015</a:t>
+              <a:t>2/3/2015</a:t>
             </a:fld>
             <a:endParaRPr lang="en-US"/>
           </a:p>
@@ -2107,7 +2108,7 @@
           <a:p>
             <a:fld id="{51647FD5-68CD-4470-B86E-1BC2872C8822}" type="datetimeFigureOut">
               <a:rPr lang="en-US" smtClean="0"/>
-              <a:t>2/1/2015</a:t>
+              <a:t>2/3/2015</a:t>
             </a:fld>
             <a:endParaRPr lang="en-US"/>
           </a:p>
@@ -2364,7 +2365,7 @@
           <a:p>
             <a:fld id="{51647FD5-68CD-4470-B86E-1BC2872C8822}" type="datetimeFigureOut">
               <a:rPr lang="en-US" smtClean="0"/>
-              <a:t>2/1/2015</a:t>
+              <a:t>2/3/2015</a:t>
             </a:fld>
             <a:endParaRPr lang="en-US"/>
           </a:p>
@@ -2577,7 +2578,7 @@
           <a:p>
             <a:fld id="{51647FD5-68CD-4470-B86E-1BC2872C8822}" type="datetimeFigureOut">
               <a:rPr lang="en-US" smtClean="0"/>
-              <a:t>2/1/2015</a:t>
+              <a:t>2/3/2015</a:t>
             </a:fld>
             <a:endParaRPr lang="en-US"/>
           </a:p>
@@ -3099,82 +3100,40 @@
           <a:p>
             <a:r>
               <a:rPr lang="en-US" dirty="0" smtClean="0"/>
-              <a:t>Update model from DB</a:t>
-            </a:r>
-            <a:endParaRPr lang="en-US" dirty="0"/>
-          </a:p>
-        </p:txBody>
-      </p:sp>
-      <p:sp>
-        <p:nvSpPr>
-          <p:cNvPr id="3" name="Content Placeholder 2"/>
-          <p:cNvSpPr>
-            <a:spLocks noGrp="1"/>
-          </p:cNvSpPr>
-          <p:nvPr>
-            <p:ph idx="1"/>
-          </p:nvPr>
-        </p:nvSpPr>
-        <p:spPr/>
-        <p:txBody>
-          <a:bodyPr/>
-          <a:lstStyle/>
-          <a:p>
-            <a:r>
-              <a:rPr lang="en-US" dirty="0" smtClean="0"/>
-              <a:t>Add a column to a table</a:t>
-            </a:r>
-          </a:p>
-          <a:p>
-            <a:r>
-              <a:rPr lang="en-US" dirty="0" smtClean="0"/>
-              <a:t>Add new table</a:t>
-            </a:r>
-          </a:p>
-          <a:p>
-            <a:r>
-              <a:rPr lang="en-US" dirty="0" smtClean="0"/>
-              <a:t>Update model from </a:t>
-            </a:r>
-            <a:r>
-              <a:rPr lang="en-US" dirty="0" err="1" smtClean="0"/>
-              <a:t>db</a:t>
-            </a:r>
-            <a:r>
-              <a:rPr lang="en-US" dirty="0" smtClean="0"/>
-              <a:t> option</a:t>
-            </a:r>
-          </a:p>
-          <a:p>
-            <a:r>
-              <a:rPr lang="en-US" dirty="0" smtClean="0"/>
-              <a:t>Designer will not alter or remove existing properties</a:t>
-            </a:r>
-          </a:p>
-          <a:p>
-            <a:pPr lvl="1"/>
-            <a:r>
-              <a:rPr lang="en-US" dirty="0" smtClean="0"/>
-              <a:t>Validate model will show this</a:t>
-            </a:r>
-          </a:p>
-          <a:p>
-            <a:pPr lvl="1"/>
-            <a:r>
-              <a:rPr lang="en-US" dirty="0" smtClean="0"/>
-              <a:t>Change property type manually</a:t>
-            </a:r>
-          </a:p>
-          <a:p>
-            <a:pPr lvl="1"/>
-            <a:endParaRPr lang="en-US" dirty="0"/>
-          </a:p>
-        </p:txBody>
-      </p:sp>
+              <a:t>Table mappings</a:t>
+            </a:r>
+            <a:endParaRPr lang="en-US" dirty="0"/>
+          </a:p>
+        </p:txBody>
+      </p:sp>
+      <p:pic>
+        <p:nvPicPr>
+          <p:cNvPr id="3" name="Picture 2"/>
+          <p:cNvPicPr>
+            <a:picLocks noChangeAspect="1"/>
+          </p:cNvPicPr>
+          <p:nvPr/>
+        </p:nvPicPr>
+        <p:blipFill>
+          <a:blip r:embed="rId2"/>
+          <a:stretch>
+            <a:fillRect/>
+          </a:stretch>
+        </p:blipFill>
+        <p:spPr>
+          <a:xfrm>
+            <a:off x="885825" y="1690689"/>
+            <a:ext cx="7372350" cy="4181475"/>
+          </a:xfrm>
+          <a:prstGeom prst="rect">
+            <a:avLst/>
+          </a:prstGeom>
+        </p:spPr>
+      </p:pic>
     </p:spTree>
     <p:extLst>
       <p:ext uri="{BB962C8B-B14F-4D97-AF65-F5344CB8AC3E}">
-        <p14:creationId xmlns:p14="http://schemas.microsoft.com/office/powerpoint/2010/main" val="450648319"/>
+        <p14:creationId xmlns:p14="http://schemas.microsoft.com/office/powerpoint/2010/main" val="774898647"/>
       </p:ext>
     </p:extLst>
   </p:cSld>
@@ -3217,6 +3176,125 @@
           <a:lstStyle/>
           <a:p>
             <a:r>
+              <a:rPr lang="en-US" dirty="0" smtClean="0"/>
+              <a:t>Update model from DB</a:t>
+            </a:r>
+            <a:endParaRPr lang="en-US" dirty="0"/>
+          </a:p>
+        </p:txBody>
+      </p:sp>
+      <p:sp>
+        <p:nvSpPr>
+          <p:cNvPr id="3" name="Content Placeholder 2"/>
+          <p:cNvSpPr>
+            <a:spLocks noGrp="1"/>
+          </p:cNvSpPr>
+          <p:nvPr>
+            <p:ph idx="1"/>
+          </p:nvPr>
+        </p:nvSpPr>
+        <p:spPr/>
+        <p:txBody>
+          <a:bodyPr/>
+          <a:lstStyle/>
+          <a:p>
+            <a:r>
+              <a:rPr lang="en-US" dirty="0" smtClean="0"/>
+              <a:t>Add a column to a table</a:t>
+            </a:r>
+          </a:p>
+          <a:p>
+            <a:r>
+              <a:rPr lang="en-US" dirty="0" smtClean="0"/>
+              <a:t>Add new table</a:t>
+            </a:r>
+          </a:p>
+          <a:p>
+            <a:r>
+              <a:rPr lang="en-US" dirty="0" smtClean="0"/>
+              <a:t>Update model from </a:t>
+            </a:r>
+            <a:r>
+              <a:rPr lang="en-US" dirty="0" err="1" smtClean="0"/>
+              <a:t>db</a:t>
+            </a:r>
+            <a:r>
+              <a:rPr lang="en-US" dirty="0" smtClean="0"/>
+              <a:t> option</a:t>
+            </a:r>
+          </a:p>
+          <a:p>
+            <a:r>
+              <a:rPr lang="en-US" dirty="0" smtClean="0"/>
+              <a:t>Designer will not alter or remove existing properties</a:t>
+            </a:r>
+          </a:p>
+          <a:p>
+            <a:pPr lvl="1"/>
+            <a:r>
+              <a:rPr lang="en-US" dirty="0" smtClean="0"/>
+              <a:t>Validate model will show this</a:t>
+            </a:r>
+          </a:p>
+          <a:p>
+            <a:pPr lvl="1"/>
+            <a:r>
+              <a:rPr lang="en-US" dirty="0" smtClean="0"/>
+              <a:t>Change property type manually</a:t>
+            </a:r>
+          </a:p>
+          <a:p>
+            <a:pPr lvl="1"/>
+            <a:endParaRPr lang="en-US" dirty="0"/>
+          </a:p>
+        </p:txBody>
+      </p:sp>
+    </p:spTree>
+    <p:extLst>
+      <p:ext uri="{BB962C8B-B14F-4D97-AF65-F5344CB8AC3E}">
+        <p14:creationId xmlns:p14="http://schemas.microsoft.com/office/powerpoint/2010/main" val="450648319"/>
+      </p:ext>
+    </p:extLst>
+  </p:cSld>
+  <p:clrMapOvr>
+    <a:masterClrMapping/>
+  </p:clrMapOvr>
+</p:sld>
+</file>
+
+<file path=ppt/slides/slide12.xml><?xml version="1.0" encoding="utf-8"?>
+<p:sld xmlns:a="http://schemas.openxmlformats.org/drawingml/2006/main" xmlns:r="http://schemas.openxmlformats.org/officeDocument/2006/relationships" xmlns:p="http://schemas.openxmlformats.org/presentationml/2006/main">
+  <p:cSld>
+    <p:spTree>
+      <p:nvGrpSpPr>
+        <p:cNvPr id="1" name=""/>
+        <p:cNvGrpSpPr/>
+        <p:nvPr/>
+      </p:nvGrpSpPr>
+      <p:grpSpPr>
+        <a:xfrm>
+          <a:off x="0" y="0"/>
+          <a:ext cx="0" cy="0"/>
+          <a:chOff x="0" y="0"/>
+          <a:chExt cx="0" cy="0"/>
+        </a:xfrm>
+      </p:grpSpPr>
+      <p:sp>
+        <p:nvSpPr>
+          <p:cNvPr id="2" name="Title 1"/>
+          <p:cNvSpPr>
+            <a:spLocks noGrp="1"/>
+          </p:cNvSpPr>
+          <p:nvPr>
+            <p:ph type="title"/>
+          </p:nvPr>
+        </p:nvSpPr>
+        <p:spPr/>
+        <p:txBody>
+          <a:bodyPr/>
+          <a:lstStyle/>
+          <a:p>
+            <a:r>
               <a:rPr lang="en-US" smtClean="0"/>
               <a:t>Summary</a:t>
             </a:r>
@@ -3268,7 +3346,7 @@
 </p:sld>
 </file>
 
-<file path=ppt/slides/slide12.xml><?xml version="1.0" encoding="utf-8"?>
+<file path=ppt/slides/slide13.xml><?xml version="1.0" encoding="utf-8"?>
 <p:sld xmlns:a="http://schemas.openxmlformats.org/drawingml/2006/main" xmlns:r="http://schemas.openxmlformats.org/officeDocument/2006/relationships" xmlns:p="http://schemas.openxmlformats.org/presentationml/2006/main">
   <p:cSld>
     <p:spTree>
@@ -3618,65 +3696,44 @@
           <a:p>
             <a:r>
               <a:rPr lang="en-US" dirty="0" smtClean="0"/>
-              <a:t>Explore the Model</a:t>
-            </a:r>
-            <a:endParaRPr lang="en-US" dirty="0"/>
-          </a:p>
-        </p:txBody>
-      </p:sp>
-      <p:sp>
-        <p:nvSpPr>
-          <p:cNvPr id="3" name="Content Placeholder 2"/>
-          <p:cNvSpPr>
-            <a:spLocks noGrp="1"/>
-          </p:cNvSpPr>
-          <p:nvPr>
-            <p:ph idx="1"/>
-          </p:nvPr>
-        </p:nvSpPr>
-        <p:spPr/>
-        <p:txBody>
-          <a:bodyPr/>
-          <a:lstStyle/>
-          <a:p>
-            <a:r>
-              <a:rPr lang="en-US" dirty="0" smtClean="0"/>
-              <a:t>Entities and Relationships</a:t>
-            </a:r>
-          </a:p>
-          <a:p>
+              <a:t>Demo: Import </a:t>
+            </a:r>
             <a:r>
               <a:rPr lang="en-US" dirty="0" err="1" smtClean="0"/>
-              <a:t>App.config</a:t>
-            </a:r>
-            <a:endParaRPr lang="en-US" dirty="0" smtClean="0"/>
-          </a:p>
-          <a:p>
-            <a:r>
-              <a:rPr lang="en-US" dirty="0" smtClean="0"/>
-              <a:t>Generated </a:t>
-            </a:r>
-            <a:r>
-              <a:rPr lang="en-US" dirty="0" smtClean="0"/>
-              <a:t>code</a:t>
-            </a:r>
-          </a:p>
-          <a:p>
-            <a:endParaRPr lang="en-US" dirty="0"/>
-          </a:p>
-          <a:p>
-            <a:r>
-              <a:rPr lang="en-US" dirty="0" smtClean="0"/>
-              <a:t>Mappings are built from the code</a:t>
-            </a:r>
-            <a:endParaRPr lang="en-US" dirty="0"/>
-          </a:p>
-        </p:txBody>
-      </p:sp>
+              <a:t>AdventureWorks</a:t>
+            </a:r>
+            <a:endParaRPr lang="en-US" dirty="0"/>
+          </a:p>
+        </p:txBody>
+      </p:sp>
+      <p:pic>
+        <p:nvPicPr>
+          <p:cNvPr id="5" name="Picture 4"/>
+          <p:cNvPicPr>
+            <a:picLocks noChangeAspect="1"/>
+          </p:cNvPicPr>
+          <p:nvPr/>
+        </p:nvPicPr>
+        <p:blipFill>
+          <a:blip r:embed="rId2"/>
+          <a:stretch>
+            <a:fillRect/>
+          </a:stretch>
+        </p:blipFill>
+        <p:spPr>
+          <a:xfrm>
+            <a:off x="1203827" y="1464906"/>
+            <a:ext cx="6736345" cy="5048541"/>
+          </a:xfrm>
+          <a:prstGeom prst="rect">
+            <a:avLst/>
+          </a:prstGeom>
+        </p:spPr>
+      </p:pic>
     </p:spTree>
     <p:extLst>
       <p:ext uri="{BB962C8B-B14F-4D97-AF65-F5344CB8AC3E}">
-        <p14:creationId xmlns:p14="http://schemas.microsoft.com/office/powerpoint/2010/main" val="2506903841"/>
+        <p14:creationId xmlns:p14="http://schemas.microsoft.com/office/powerpoint/2010/main" val="2588089309"/>
       </p:ext>
     </p:extLst>
   </p:cSld>
@@ -3720,6 +3777,104 @@
           <a:p>
             <a:r>
               <a:rPr lang="en-US" dirty="0" smtClean="0"/>
+              <a:t>Explore the Model</a:t>
+            </a:r>
+            <a:endParaRPr lang="en-US" dirty="0"/>
+          </a:p>
+        </p:txBody>
+      </p:sp>
+      <p:sp>
+        <p:nvSpPr>
+          <p:cNvPr id="3" name="Content Placeholder 2"/>
+          <p:cNvSpPr>
+            <a:spLocks noGrp="1"/>
+          </p:cNvSpPr>
+          <p:nvPr>
+            <p:ph idx="1"/>
+          </p:nvPr>
+        </p:nvSpPr>
+        <p:spPr/>
+        <p:txBody>
+          <a:bodyPr/>
+          <a:lstStyle/>
+          <a:p>
+            <a:r>
+              <a:rPr lang="en-US" dirty="0" smtClean="0"/>
+              <a:t>Entities and Relationships</a:t>
+            </a:r>
+          </a:p>
+          <a:p>
+            <a:r>
+              <a:rPr lang="en-US" dirty="0" err="1" smtClean="0"/>
+              <a:t>App.config</a:t>
+            </a:r>
+            <a:endParaRPr lang="en-US" dirty="0" smtClean="0"/>
+          </a:p>
+          <a:p>
+            <a:r>
+              <a:rPr lang="en-US" dirty="0" smtClean="0"/>
+              <a:t>Generated code</a:t>
+            </a:r>
+          </a:p>
+          <a:p>
+            <a:endParaRPr lang="en-US" dirty="0"/>
+          </a:p>
+          <a:p>
+            <a:r>
+              <a:rPr lang="en-US" dirty="0" smtClean="0"/>
+              <a:t>Mappings are built from the code</a:t>
+            </a:r>
+            <a:endParaRPr lang="en-US" dirty="0"/>
+          </a:p>
+        </p:txBody>
+      </p:sp>
+    </p:spTree>
+    <p:extLst>
+      <p:ext uri="{BB962C8B-B14F-4D97-AF65-F5344CB8AC3E}">
+        <p14:creationId xmlns:p14="http://schemas.microsoft.com/office/powerpoint/2010/main" val="2506903841"/>
+      </p:ext>
+    </p:extLst>
+  </p:cSld>
+  <p:clrMapOvr>
+    <a:masterClrMapping/>
+  </p:clrMapOvr>
+</p:sld>
+</file>
+
+<file path=ppt/slides/slide6.xml><?xml version="1.0" encoding="utf-8"?>
+<p:sld xmlns:a="http://schemas.openxmlformats.org/drawingml/2006/main" xmlns:r="http://schemas.openxmlformats.org/officeDocument/2006/relationships" xmlns:p="http://schemas.openxmlformats.org/presentationml/2006/main">
+  <p:cSld>
+    <p:spTree>
+      <p:nvGrpSpPr>
+        <p:cNvPr id="1" name=""/>
+        <p:cNvGrpSpPr/>
+        <p:nvPr/>
+      </p:nvGrpSpPr>
+      <p:grpSpPr>
+        <a:xfrm>
+          <a:off x="0" y="0"/>
+          <a:ext cx="0" cy="0"/>
+          <a:chOff x="0" y="0"/>
+          <a:chExt cx="0" cy="0"/>
+        </a:xfrm>
+      </p:grpSpPr>
+      <p:sp>
+        <p:nvSpPr>
+          <p:cNvPr id="2" name="Title 1"/>
+          <p:cNvSpPr>
+            <a:spLocks noGrp="1"/>
+          </p:cNvSpPr>
+          <p:nvPr>
+            <p:ph type="title"/>
+          </p:nvPr>
+        </p:nvSpPr>
+        <p:spPr/>
+        <p:txBody>
+          <a:bodyPr/>
+          <a:lstStyle/>
+          <a:p>
+            <a:r>
+              <a:rPr lang="en-US" dirty="0" smtClean="0"/>
               <a:t>Auto-generated </a:t>
             </a:r>
             <a:r>
@@ -3829,7 +3984,7 @@
 </p:sld>
 </file>
 
-<file path=ppt/slides/slide6.xml><?xml version="1.0" encoding="utf-8"?>
+<file path=ppt/slides/slide7.xml><?xml version="1.0" encoding="utf-8"?>
 <p:sld xmlns:a="http://schemas.openxmlformats.org/drawingml/2006/main" xmlns:r="http://schemas.openxmlformats.org/officeDocument/2006/relationships" xmlns:p="http://schemas.openxmlformats.org/presentationml/2006/main">
   <p:cSld>
     <p:spTree>
@@ -3935,7 +4090,7 @@
 </p:sld>
 </file>
 
-<file path=ppt/slides/slide7.xml><?xml version="1.0" encoding="utf-8"?>
+<file path=ppt/slides/slide8.xml><?xml version="1.0" encoding="utf-8"?>
 <p:sld xmlns:a="http://schemas.openxmlformats.org/drawingml/2006/main" xmlns:r="http://schemas.openxmlformats.org/officeDocument/2006/relationships" xmlns:p="http://schemas.openxmlformats.org/presentationml/2006/main">
   <p:cSld>
     <p:spTree>
@@ -4056,7 +4211,7 @@
 </p:sld>
 </file>
 
-<file path=ppt/slides/slide8.xml><?xml version="1.0" encoding="utf-8"?>
+<file path=ppt/slides/slide9.xml><?xml version="1.0" encoding="utf-8"?>
 <p:sld xmlns:a="http://schemas.openxmlformats.org/drawingml/2006/main" xmlns:r="http://schemas.openxmlformats.org/officeDocument/2006/relationships" xmlns:p="http://schemas.openxmlformats.org/presentationml/2006/main">
   <p:cSld>
     <p:spTree>
@@ -4166,83 +4321,6 @@
     <p:extLst>
       <p:ext uri="{BB962C8B-B14F-4D97-AF65-F5344CB8AC3E}">
         <p14:creationId xmlns:p14="http://schemas.microsoft.com/office/powerpoint/2010/main" val="3304952894"/>
-      </p:ext>
-    </p:extLst>
-  </p:cSld>
-  <p:clrMapOvr>
-    <a:masterClrMapping/>
-  </p:clrMapOvr>
-</p:sld>
-</file>
-
-<file path=ppt/slides/slide9.xml><?xml version="1.0" encoding="utf-8"?>
-<p:sld xmlns:a="http://schemas.openxmlformats.org/drawingml/2006/main" xmlns:r="http://schemas.openxmlformats.org/officeDocument/2006/relationships" xmlns:p="http://schemas.openxmlformats.org/presentationml/2006/main">
-  <p:cSld>
-    <p:spTree>
-      <p:nvGrpSpPr>
-        <p:cNvPr id="1" name=""/>
-        <p:cNvGrpSpPr/>
-        <p:nvPr/>
-      </p:nvGrpSpPr>
-      <p:grpSpPr>
-        <a:xfrm>
-          <a:off x="0" y="0"/>
-          <a:ext cx="0" cy="0"/>
-          <a:chOff x="0" y="0"/>
-          <a:chExt cx="0" cy="0"/>
-        </a:xfrm>
-      </p:grpSpPr>
-      <p:sp>
-        <p:nvSpPr>
-          <p:cNvPr id="2" name="Title 1"/>
-          <p:cNvSpPr>
-            <a:spLocks noGrp="1"/>
-          </p:cNvSpPr>
-          <p:nvPr>
-            <p:ph type="title"/>
-          </p:nvPr>
-        </p:nvSpPr>
-        <p:spPr/>
-        <p:txBody>
-          <a:bodyPr/>
-          <a:lstStyle/>
-          <a:p>
-            <a:r>
-              <a:rPr lang="en-US" dirty="0" smtClean="0"/>
-              <a:t>Table mappings</a:t>
-            </a:r>
-            <a:endParaRPr lang="en-US" dirty="0"/>
-          </a:p>
-        </p:txBody>
-      </p:sp>
-      <p:pic>
-        <p:nvPicPr>
-          <p:cNvPr id="3" name="Picture 2"/>
-          <p:cNvPicPr>
-            <a:picLocks noChangeAspect="1"/>
-          </p:cNvPicPr>
-          <p:nvPr/>
-        </p:nvPicPr>
-        <p:blipFill>
-          <a:blip r:embed="rId2"/>
-          <a:stretch>
-            <a:fillRect/>
-          </a:stretch>
-        </p:blipFill>
-        <p:spPr>
-          <a:xfrm>
-            <a:off x="885825" y="1690689"/>
-            <a:ext cx="7372350" cy="4181475"/>
-          </a:xfrm>
-          <a:prstGeom prst="rect">
-            <a:avLst/>
-          </a:prstGeom>
-        </p:spPr>
-      </p:pic>
-    </p:spTree>
-    <p:extLst>
-      <p:ext uri="{BB962C8B-B14F-4D97-AF65-F5344CB8AC3E}">
-        <p14:creationId xmlns:p14="http://schemas.microsoft.com/office/powerpoint/2010/main" val="774898647"/>
       </p:ext>
     </p:extLst>
   </p:cSld>

</xml_diff>